<commit_message>
f string notes released
</commit_message>
<xml_diff>
--- a/Images_Youmna.pptx
+++ b/Images_Youmna.pptx
@@ -280,7 +280,7 @@
           <a:p>
             <a:fld id="{0F77A28A-3D95-4505-B6A9-5725374991B4}" type="datetimeFigureOut">
               <a:rPr lang="fr-CA" smtClean="0"/>
-              <a:t>2024-09-10</a:t>
+              <a:t>2024-09-12</a:t>
             </a:fld>
             <a:endParaRPr lang="fr-CA"/>
           </a:p>
@@ -480,7 +480,7 @@
           <a:p>
             <a:fld id="{0F77A28A-3D95-4505-B6A9-5725374991B4}" type="datetimeFigureOut">
               <a:rPr lang="fr-CA" smtClean="0"/>
-              <a:t>2024-09-10</a:t>
+              <a:t>2024-09-12</a:t>
             </a:fld>
             <a:endParaRPr lang="fr-CA"/>
           </a:p>
@@ -690,7 +690,7 @@
           <a:p>
             <a:fld id="{0F77A28A-3D95-4505-B6A9-5725374991B4}" type="datetimeFigureOut">
               <a:rPr lang="fr-CA" smtClean="0"/>
-              <a:t>2024-09-10</a:t>
+              <a:t>2024-09-12</a:t>
             </a:fld>
             <a:endParaRPr lang="fr-CA"/>
           </a:p>
@@ -890,7 +890,7 @@
           <a:p>
             <a:fld id="{0F77A28A-3D95-4505-B6A9-5725374991B4}" type="datetimeFigureOut">
               <a:rPr lang="fr-CA" smtClean="0"/>
-              <a:t>2024-09-10</a:t>
+              <a:t>2024-09-12</a:t>
             </a:fld>
             <a:endParaRPr lang="fr-CA"/>
           </a:p>
@@ -1166,7 +1166,7 @@
           <a:p>
             <a:fld id="{0F77A28A-3D95-4505-B6A9-5725374991B4}" type="datetimeFigureOut">
               <a:rPr lang="fr-CA" smtClean="0"/>
-              <a:t>2024-09-10</a:t>
+              <a:t>2024-09-12</a:t>
             </a:fld>
             <a:endParaRPr lang="fr-CA"/>
           </a:p>
@@ -1434,7 +1434,7 @@
           <a:p>
             <a:fld id="{0F77A28A-3D95-4505-B6A9-5725374991B4}" type="datetimeFigureOut">
               <a:rPr lang="fr-CA" smtClean="0"/>
-              <a:t>2024-09-10</a:t>
+              <a:t>2024-09-12</a:t>
             </a:fld>
             <a:endParaRPr lang="fr-CA"/>
           </a:p>
@@ -1849,7 +1849,7 @@
           <a:p>
             <a:fld id="{0F77A28A-3D95-4505-B6A9-5725374991B4}" type="datetimeFigureOut">
               <a:rPr lang="fr-CA" smtClean="0"/>
-              <a:t>2024-09-10</a:t>
+              <a:t>2024-09-12</a:t>
             </a:fld>
             <a:endParaRPr lang="fr-CA"/>
           </a:p>
@@ -1991,7 +1991,7 @@
           <a:p>
             <a:fld id="{0F77A28A-3D95-4505-B6A9-5725374991B4}" type="datetimeFigureOut">
               <a:rPr lang="fr-CA" smtClean="0"/>
-              <a:t>2024-09-10</a:t>
+              <a:t>2024-09-12</a:t>
             </a:fld>
             <a:endParaRPr lang="fr-CA"/>
           </a:p>
@@ -2104,7 +2104,7 @@
           <a:p>
             <a:fld id="{0F77A28A-3D95-4505-B6A9-5725374991B4}" type="datetimeFigureOut">
               <a:rPr lang="fr-CA" smtClean="0"/>
-              <a:t>2024-09-10</a:t>
+              <a:t>2024-09-12</a:t>
             </a:fld>
             <a:endParaRPr lang="fr-CA"/>
           </a:p>
@@ -2417,7 +2417,7 @@
           <a:p>
             <a:fld id="{0F77A28A-3D95-4505-B6A9-5725374991B4}" type="datetimeFigureOut">
               <a:rPr lang="fr-CA" smtClean="0"/>
-              <a:t>2024-09-10</a:t>
+              <a:t>2024-09-12</a:t>
             </a:fld>
             <a:endParaRPr lang="fr-CA"/>
           </a:p>
@@ -2706,7 +2706,7 @@
           <a:p>
             <a:fld id="{0F77A28A-3D95-4505-B6A9-5725374991B4}" type="datetimeFigureOut">
               <a:rPr lang="fr-CA" smtClean="0"/>
-              <a:t>2024-09-10</a:t>
+              <a:t>2024-09-12</a:t>
             </a:fld>
             <a:endParaRPr lang="fr-CA"/>
           </a:p>
@@ -2949,7 +2949,7 @@
           <a:p>
             <a:fld id="{0F77A28A-3D95-4505-B6A9-5725374991B4}" type="datetimeFigureOut">
               <a:rPr lang="fr-CA" smtClean="0"/>
-              <a:t>2024-09-10</a:t>
+              <a:t>2024-09-12</a:t>
             </a:fld>
             <a:endParaRPr lang="fr-CA"/>
           </a:p>
@@ -3824,8 +3824,8 @@
         </p:nvSpPr>
         <p:spPr>
           <a:xfrm>
-            <a:off x="7973988" y="3136612"/>
-            <a:ext cx="3824722" cy="584775"/>
+            <a:off x="7973987" y="3136612"/>
+            <a:ext cx="3952541" cy="584775"/>
           </a:xfrm>
           <a:prstGeom prst="rect">
             <a:avLst/>
@@ -3843,7 +3843,7 @@
                 <a:latin typeface="Courier New" panose="02070309020205020404" pitchFamily="49" charset="0"/>
                 <a:cs typeface="Courier New" panose="02070309020205020404" pitchFamily="49" charset="0"/>
               </a:rPr>
-              <a:t>f"{pi:&gt;10.7}"</a:t>
+              <a:t>f"{pi:&gt;10.6f}"</a:t>
             </a:r>
           </a:p>
         </p:txBody>
@@ -3863,7 +3863,7 @@
           <p:nvPr>
             <p:extLst>
               <p:ext uri="{D42A27DB-BD31-4B8C-83A1-F6EECF244321}">
-                <p14:modId xmlns:p14="http://schemas.microsoft.com/office/powerpoint/2010/main" val="2429657933"/>
+                <p14:modId xmlns:p14="http://schemas.microsoft.com/office/powerpoint/2010/main" val="609966113"/>
               </p:ext>
             </p:extLst>
           </p:nvPr>
@@ -5291,7 +5291,7 @@
         <p:spPr>
           <a:xfrm>
             <a:off x="8091975" y="4871789"/>
-            <a:ext cx="3706735" cy="584775"/>
+            <a:ext cx="3952541" cy="584775"/>
           </a:xfrm>
           <a:prstGeom prst="rect">
             <a:avLst/>
@@ -5309,7 +5309,7 @@
                 <a:latin typeface="Courier New" panose="02070309020205020404" pitchFamily="49" charset="0"/>
                 <a:cs typeface="Courier New" panose="02070309020205020404" pitchFamily="49" charset="0"/>
               </a:rPr>
-              <a:t>f"{pi:^10.7}"</a:t>
+              <a:t>f"{pi:^10.6f}"</a:t>
             </a:r>
           </a:p>
         </p:txBody>
@@ -5329,7 +5329,7 @@
           <p:nvPr>
             <p:extLst>
               <p:ext uri="{D42A27DB-BD31-4B8C-83A1-F6EECF244321}">
-                <p14:modId xmlns:p14="http://schemas.microsoft.com/office/powerpoint/2010/main" val="1406236081"/>
+                <p14:modId xmlns:p14="http://schemas.microsoft.com/office/powerpoint/2010/main" val="703088568"/>
               </p:ext>
             </p:extLst>
           </p:nvPr>
@@ -6775,7 +6775,7 @@
                 <a:latin typeface="Courier New" panose="02070309020205020404" pitchFamily="49" charset="0"/>
                 <a:cs typeface="Courier New" panose="02070309020205020404" pitchFamily="49" charset="0"/>
               </a:rPr>
-              <a:t>f"{pi:&lt;10.7}"</a:t>
+              <a:t>f"{pi:&lt;10.6f}"</a:t>
             </a:r>
           </a:p>
         </p:txBody>
@@ -6795,7 +6795,7 @@
           <p:nvPr>
             <p:extLst>
               <p:ext uri="{D42A27DB-BD31-4B8C-83A1-F6EECF244321}">
-                <p14:modId xmlns:p14="http://schemas.microsoft.com/office/powerpoint/2010/main" val="3285153405"/>
+                <p14:modId xmlns:p14="http://schemas.microsoft.com/office/powerpoint/2010/main" val="706387085"/>
               </p:ext>
             </p:extLst>
           </p:nvPr>
@@ -14320,7 +14320,7 @@
           <p:nvPr>
             <p:extLst>
               <p:ext uri="{D42A27DB-BD31-4B8C-83A1-F6EECF244321}">
-                <p14:modId xmlns:p14="http://schemas.microsoft.com/office/powerpoint/2010/main" val="3383719210"/>
+                <p14:modId xmlns:p14="http://schemas.microsoft.com/office/powerpoint/2010/main" val="3321140085"/>
               </p:ext>
             </p:extLst>
           </p:nvPr>
@@ -15756,7 +15756,7 @@
         <p:spPr>
           <a:xfrm>
             <a:off x="2498755" y="953418"/>
-            <a:ext cx="3223620" cy="584775"/>
+            <a:ext cx="3223620" cy="1077218"/>
           </a:xfrm>
           <a:prstGeom prst="rect">
             <a:avLst/>
@@ -15774,7 +15774,7 @@
                 <a:latin typeface="Courier New" panose="02070309020205020404" pitchFamily="49" charset="0"/>
                 <a:cs typeface="Courier New" panose="02070309020205020404" pitchFamily="49" charset="0"/>
               </a:rPr>
-              <a:t>f"{pi:10.9}"</a:t>
+              <a:t>f"{pi:10.8f}"</a:t>
             </a:r>
           </a:p>
         </p:txBody>
@@ -15793,8 +15793,8 @@
         </p:nvSpPr>
         <p:spPr>
           <a:xfrm>
-            <a:off x="2595743" y="3755571"/>
-            <a:ext cx="3223620" cy="584775"/>
+            <a:off x="2595742" y="3755571"/>
+            <a:ext cx="3500257" cy="584775"/>
           </a:xfrm>
           <a:prstGeom prst="rect">
             <a:avLst/>
@@ -15812,7 +15812,7 @@
                 <a:latin typeface="Courier New" panose="02070309020205020404" pitchFamily="49" charset="0"/>
                 <a:cs typeface="Courier New" panose="02070309020205020404" pitchFamily="49" charset="0"/>
               </a:rPr>
-              <a:t>f"{pi:10.7}"</a:t>
+              <a:t>f"{pi:10.6f}"</a:t>
             </a:r>
           </a:p>
         </p:txBody>
@@ -15832,7 +15832,7 @@
           <p:nvPr>
             <p:extLst>
               <p:ext uri="{D42A27DB-BD31-4B8C-83A1-F6EECF244321}">
-                <p14:modId xmlns:p14="http://schemas.microsoft.com/office/powerpoint/2010/main" val="1166812510"/>
+                <p14:modId xmlns:p14="http://schemas.microsoft.com/office/powerpoint/2010/main" val="1014428210"/>
               </p:ext>
             </p:extLst>
           </p:nvPr>

</xml_diff>

<commit_message>
Re-organizing the notes on functions
</commit_message>
<xml_diff>
--- a/Images_Youmna.pptx
+++ b/Images_Youmna.pptx
@@ -4,6 +4,9 @@
   <p:sldMasterIdLst>
     <p:sldMasterId id="2147483648" r:id="rId1"/>
   </p:sldMasterIdLst>
+  <p:notesMasterIdLst>
+    <p:notesMasterId r:id="rId24"/>
+  </p:notesMasterIdLst>
   <p:sldIdLst>
     <p:sldId id="262" r:id="rId2"/>
     <p:sldId id="263" r:id="rId3"/>
@@ -15,16 +18,18 @@
     <p:sldId id="274" r:id="rId9"/>
     <p:sldId id="275" r:id="rId10"/>
     <p:sldId id="276" r:id="rId11"/>
-    <p:sldId id="270" r:id="rId12"/>
-    <p:sldId id="271" r:id="rId13"/>
-    <p:sldId id="259" r:id="rId14"/>
-    <p:sldId id="260" r:id="rId15"/>
-    <p:sldId id="258" r:id="rId16"/>
-    <p:sldId id="261" r:id="rId17"/>
-    <p:sldId id="266" r:id="rId18"/>
-    <p:sldId id="267" r:id="rId19"/>
-    <p:sldId id="268" r:id="rId20"/>
-    <p:sldId id="269" r:id="rId21"/>
+    <p:sldId id="277" r:id="rId12"/>
+    <p:sldId id="278" r:id="rId13"/>
+    <p:sldId id="270" r:id="rId14"/>
+    <p:sldId id="271" r:id="rId15"/>
+    <p:sldId id="259" r:id="rId16"/>
+    <p:sldId id="260" r:id="rId17"/>
+    <p:sldId id="258" r:id="rId18"/>
+    <p:sldId id="261" r:id="rId19"/>
+    <p:sldId id="266" r:id="rId20"/>
+    <p:sldId id="267" r:id="rId21"/>
+    <p:sldId id="268" r:id="rId22"/>
+    <p:sldId id="269" r:id="rId23"/>
   </p:sldIdLst>
   <p:sldSz cx="12192000" cy="6858000"/>
   <p:notesSz cx="6858000" cy="9144000"/>
@@ -131,6 +136,440 @@
 </p:presentation>
 </file>
 
+<file path=ppt/notesMasters/notesMaster1.xml><?xml version="1.0" encoding="utf-8"?>
+<p:notesMaster xmlns:a="http://schemas.openxmlformats.org/drawingml/2006/main" xmlns:r="http://schemas.openxmlformats.org/officeDocument/2006/relationships" xmlns:p="http://schemas.openxmlformats.org/presentationml/2006/main">
+  <p:cSld>
+    <p:bg>
+      <p:bgRef idx="1001">
+        <a:schemeClr val="bg1"/>
+      </p:bgRef>
+    </p:bg>
+    <p:spTree>
+      <p:nvGrpSpPr>
+        <p:cNvPr id="1" name=""/>
+        <p:cNvGrpSpPr/>
+        <p:nvPr/>
+      </p:nvGrpSpPr>
+      <p:grpSpPr>
+        <a:xfrm>
+          <a:off x="0" y="0"/>
+          <a:ext cx="0" cy="0"/>
+          <a:chOff x="0" y="0"/>
+          <a:chExt cx="0" cy="0"/>
+        </a:xfrm>
+      </p:grpSpPr>
+      <p:sp>
+        <p:nvSpPr>
+          <p:cNvPr id="2" name="Header Placeholder 1"/>
+          <p:cNvSpPr>
+            <a:spLocks noGrp="1"/>
+          </p:cNvSpPr>
+          <p:nvPr>
+            <p:ph type="hdr" sz="quarter"/>
+          </p:nvPr>
+        </p:nvSpPr>
+        <p:spPr>
+          <a:xfrm>
+            <a:off x="0" y="0"/>
+            <a:ext cx="2971800" cy="458788"/>
+          </a:xfrm>
+          <a:prstGeom prst="rect">
+            <a:avLst/>
+          </a:prstGeom>
+        </p:spPr>
+        <p:txBody>
+          <a:bodyPr vert="horz" lIns="91440" tIns="45720" rIns="91440" bIns="45720" rtlCol="0"/>
+          <a:lstStyle>
+            <a:lvl1pPr algn="l">
+              <a:defRPr sz="1200"/>
+            </a:lvl1pPr>
+          </a:lstStyle>
+          <a:p>
+            <a:endParaRPr lang="fr-CA"/>
+          </a:p>
+        </p:txBody>
+      </p:sp>
+      <p:sp>
+        <p:nvSpPr>
+          <p:cNvPr id="3" name="Date Placeholder 2"/>
+          <p:cNvSpPr>
+            <a:spLocks noGrp="1"/>
+          </p:cNvSpPr>
+          <p:nvPr>
+            <p:ph type="dt" idx="1"/>
+          </p:nvPr>
+        </p:nvSpPr>
+        <p:spPr>
+          <a:xfrm>
+            <a:off x="3884613" y="0"/>
+            <a:ext cx="2971800" cy="458788"/>
+          </a:xfrm>
+          <a:prstGeom prst="rect">
+            <a:avLst/>
+          </a:prstGeom>
+        </p:spPr>
+        <p:txBody>
+          <a:bodyPr vert="horz" lIns="91440" tIns="45720" rIns="91440" bIns="45720" rtlCol="0"/>
+          <a:lstStyle>
+            <a:lvl1pPr algn="r">
+              <a:defRPr sz="1200"/>
+            </a:lvl1pPr>
+          </a:lstStyle>
+          <a:p>
+            <a:fld id="{1CCE3347-6229-4A36-B7EA-84D3DDFD5B0A}" type="datetimeFigureOut">
+              <a:rPr lang="fr-CA" smtClean="0"/>
+              <a:t>2024-09-25</a:t>
+            </a:fld>
+            <a:endParaRPr lang="fr-CA"/>
+          </a:p>
+        </p:txBody>
+      </p:sp>
+      <p:sp>
+        <p:nvSpPr>
+          <p:cNvPr id="4" name="Slide Image Placeholder 3"/>
+          <p:cNvSpPr>
+            <a:spLocks noGrp="1" noRot="1" noChangeAspect="1"/>
+          </p:cNvSpPr>
+          <p:nvPr>
+            <p:ph type="sldImg" idx="2"/>
+          </p:nvPr>
+        </p:nvSpPr>
+        <p:spPr>
+          <a:xfrm>
+            <a:off x="685800" y="1143000"/>
+            <a:ext cx="5486400" cy="3086100"/>
+          </a:xfrm>
+          <a:prstGeom prst="rect">
+            <a:avLst/>
+          </a:prstGeom>
+          <a:noFill/>
+          <a:ln w="12700">
+            <a:solidFill>
+              <a:prstClr val="black"/>
+            </a:solidFill>
+          </a:ln>
+        </p:spPr>
+        <p:txBody>
+          <a:bodyPr vert="horz" lIns="91440" tIns="45720" rIns="91440" bIns="45720" rtlCol="0" anchor="ctr"/>
+          <a:lstStyle/>
+          <a:p>
+            <a:endParaRPr lang="fr-CA"/>
+          </a:p>
+        </p:txBody>
+      </p:sp>
+      <p:sp>
+        <p:nvSpPr>
+          <p:cNvPr id="5" name="Notes Placeholder 4"/>
+          <p:cNvSpPr>
+            <a:spLocks noGrp="1"/>
+          </p:cNvSpPr>
+          <p:nvPr>
+            <p:ph type="body" sz="quarter" idx="3"/>
+          </p:nvPr>
+        </p:nvSpPr>
+        <p:spPr>
+          <a:xfrm>
+            <a:off x="685800" y="4400550"/>
+            <a:ext cx="5486400" cy="3600450"/>
+          </a:xfrm>
+          <a:prstGeom prst="rect">
+            <a:avLst/>
+          </a:prstGeom>
+        </p:spPr>
+        <p:txBody>
+          <a:bodyPr vert="horz" lIns="91440" tIns="45720" rIns="91440" bIns="45720" rtlCol="0"/>
+          <a:lstStyle/>
+          <a:p>
+            <a:pPr lvl="0"/>
+            <a:r>
+              <a:rPr lang="en-US"/>
+              <a:t>Click to edit Master text styles</a:t>
+            </a:r>
+          </a:p>
+          <a:p>
+            <a:pPr lvl="1"/>
+            <a:r>
+              <a:rPr lang="en-US"/>
+              <a:t>Second level</a:t>
+            </a:r>
+          </a:p>
+          <a:p>
+            <a:pPr lvl="2"/>
+            <a:r>
+              <a:rPr lang="en-US"/>
+              <a:t>Third level</a:t>
+            </a:r>
+          </a:p>
+          <a:p>
+            <a:pPr lvl="3"/>
+            <a:r>
+              <a:rPr lang="en-US"/>
+              <a:t>Fourth level</a:t>
+            </a:r>
+          </a:p>
+          <a:p>
+            <a:pPr lvl="4"/>
+            <a:r>
+              <a:rPr lang="en-US"/>
+              <a:t>Fifth level</a:t>
+            </a:r>
+            <a:endParaRPr lang="fr-CA"/>
+          </a:p>
+        </p:txBody>
+      </p:sp>
+      <p:sp>
+        <p:nvSpPr>
+          <p:cNvPr id="6" name="Footer Placeholder 5"/>
+          <p:cNvSpPr>
+            <a:spLocks noGrp="1"/>
+          </p:cNvSpPr>
+          <p:nvPr>
+            <p:ph type="ftr" sz="quarter" idx="4"/>
+          </p:nvPr>
+        </p:nvSpPr>
+        <p:spPr>
+          <a:xfrm>
+            <a:off x="0" y="8685213"/>
+            <a:ext cx="2971800" cy="458787"/>
+          </a:xfrm>
+          <a:prstGeom prst="rect">
+            <a:avLst/>
+          </a:prstGeom>
+        </p:spPr>
+        <p:txBody>
+          <a:bodyPr vert="horz" lIns="91440" tIns="45720" rIns="91440" bIns="45720" rtlCol="0" anchor="b"/>
+          <a:lstStyle>
+            <a:lvl1pPr algn="l">
+              <a:defRPr sz="1200"/>
+            </a:lvl1pPr>
+          </a:lstStyle>
+          <a:p>
+            <a:endParaRPr lang="fr-CA"/>
+          </a:p>
+        </p:txBody>
+      </p:sp>
+      <p:sp>
+        <p:nvSpPr>
+          <p:cNvPr id="7" name="Slide Number Placeholder 6"/>
+          <p:cNvSpPr>
+            <a:spLocks noGrp="1"/>
+          </p:cNvSpPr>
+          <p:nvPr>
+            <p:ph type="sldNum" sz="quarter" idx="5"/>
+          </p:nvPr>
+        </p:nvSpPr>
+        <p:spPr>
+          <a:xfrm>
+            <a:off x="3884613" y="8685213"/>
+            <a:ext cx="2971800" cy="458787"/>
+          </a:xfrm>
+          <a:prstGeom prst="rect">
+            <a:avLst/>
+          </a:prstGeom>
+        </p:spPr>
+        <p:txBody>
+          <a:bodyPr vert="horz" lIns="91440" tIns="45720" rIns="91440" bIns="45720" rtlCol="0" anchor="b"/>
+          <a:lstStyle>
+            <a:lvl1pPr algn="r">
+              <a:defRPr sz="1200"/>
+            </a:lvl1pPr>
+          </a:lstStyle>
+          <a:p>
+            <a:fld id="{DC469113-9F80-4FF7-8D09-31083FF4FEEC}" type="slidenum">
+              <a:rPr lang="fr-CA" smtClean="0"/>
+              <a:t>‹#›</a:t>
+            </a:fld>
+            <a:endParaRPr lang="fr-CA"/>
+          </a:p>
+        </p:txBody>
+      </p:sp>
+    </p:spTree>
+    <p:extLst>
+      <p:ext uri="{BB962C8B-B14F-4D97-AF65-F5344CB8AC3E}">
+        <p14:creationId xmlns:p14="http://schemas.microsoft.com/office/powerpoint/2010/main" val="1708997768"/>
+      </p:ext>
+    </p:extLst>
+  </p:cSld>
+  <p:clrMap bg1="lt1" tx1="dk1" bg2="lt2" tx2="dk2" accent1="accent1" accent2="accent2" accent3="accent3" accent4="accent4" accent5="accent5" accent6="accent6" hlink="hlink" folHlink="folHlink"/>
+  <p:notesStyle>
+    <a:lvl1pPr marL="0" algn="l" defTabSz="914400" rtl="0" eaLnBrk="1" latinLnBrk="0" hangingPunct="1">
+      <a:defRPr sz="1200" kern="1200">
+        <a:solidFill>
+          <a:schemeClr val="tx1"/>
+        </a:solidFill>
+        <a:latin typeface="+mn-lt"/>
+        <a:ea typeface="+mn-ea"/>
+        <a:cs typeface="+mn-cs"/>
+      </a:defRPr>
+    </a:lvl1pPr>
+    <a:lvl2pPr marL="457200" algn="l" defTabSz="914400" rtl="0" eaLnBrk="1" latinLnBrk="0" hangingPunct="1">
+      <a:defRPr sz="1200" kern="1200">
+        <a:solidFill>
+          <a:schemeClr val="tx1"/>
+        </a:solidFill>
+        <a:latin typeface="+mn-lt"/>
+        <a:ea typeface="+mn-ea"/>
+        <a:cs typeface="+mn-cs"/>
+      </a:defRPr>
+    </a:lvl2pPr>
+    <a:lvl3pPr marL="914400" algn="l" defTabSz="914400" rtl="0" eaLnBrk="1" latinLnBrk="0" hangingPunct="1">
+      <a:defRPr sz="1200" kern="1200">
+        <a:solidFill>
+          <a:schemeClr val="tx1"/>
+        </a:solidFill>
+        <a:latin typeface="+mn-lt"/>
+        <a:ea typeface="+mn-ea"/>
+        <a:cs typeface="+mn-cs"/>
+      </a:defRPr>
+    </a:lvl3pPr>
+    <a:lvl4pPr marL="1371600" algn="l" defTabSz="914400" rtl="0" eaLnBrk="1" latinLnBrk="0" hangingPunct="1">
+      <a:defRPr sz="1200" kern="1200">
+        <a:solidFill>
+          <a:schemeClr val="tx1"/>
+        </a:solidFill>
+        <a:latin typeface="+mn-lt"/>
+        <a:ea typeface="+mn-ea"/>
+        <a:cs typeface="+mn-cs"/>
+      </a:defRPr>
+    </a:lvl4pPr>
+    <a:lvl5pPr marL="1828800" algn="l" defTabSz="914400" rtl="0" eaLnBrk="1" latinLnBrk="0" hangingPunct="1">
+      <a:defRPr sz="1200" kern="1200">
+        <a:solidFill>
+          <a:schemeClr val="tx1"/>
+        </a:solidFill>
+        <a:latin typeface="+mn-lt"/>
+        <a:ea typeface="+mn-ea"/>
+        <a:cs typeface="+mn-cs"/>
+      </a:defRPr>
+    </a:lvl5pPr>
+    <a:lvl6pPr marL="2286000" algn="l" defTabSz="914400" rtl="0" eaLnBrk="1" latinLnBrk="0" hangingPunct="1">
+      <a:defRPr sz="1200" kern="1200">
+        <a:solidFill>
+          <a:schemeClr val="tx1"/>
+        </a:solidFill>
+        <a:latin typeface="+mn-lt"/>
+        <a:ea typeface="+mn-ea"/>
+        <a:cs typeface="+mn-cs"/>
+      </a:defRPr>
+    </a:lvl6pPr>
+    <a:lvl7pPr marL="2743200" algn="l" defTabSz="914400" rtl="0" eaLnBrk="1" latinLnBrk="0" hangingPunct="1">
+      <a:defRPr sz="1200" kern="1200">
+        <a:solidFill>
+          <a:schemeClr val="tx1"/>
+        </a:solidFill>
+        <a:latin typeface="+mn-lt"/>
+        <a:ea typeface="+mn-ea"/>
+        <a:cs typeface="+mn-cs"/>
+      </a:defRPr>
+    </a:lvl7pPr>
+    <a:lvl8pPr marL="3200400" algn="l" defTabSz="914400" rtl="0" eaLnBrk="1" latinLnBrk="0" hangingPunct="1">
+      <a:defRPr sz="1200" kern="1200">
+        <a:solidFill>
+          <a:schemeClr val="tx1"/>
+        </a:solidFill>
+        <a:latin typeface="+mn-lt"/>
+        <a:ea typeface="+mn-ea"/>
+        <a:cs typeface="+mn-cs"/>
+      </a:defRPr>
+    </a:lvl8pPr>
+    <a:lvl9pPr marL="3657600" algn="l" defTabSz="914400" rtl="0" eaLnBrk="1" latinLnBrk="0" hangingPunct="1">
+      <a:defRPr sz="1200" kern="1200">
+        <a:solidFill>
+          <a:schemeClr val="tx1"/>
+        </a:solidFill>
+        <a:latin typeface="+mn-lt"/>
+        <a:ea typeface="+mn-ea"/>
+        <a:cs typeface="+mn-cs"/>
+      </a:defRPr>
+    </a:lvl9pPr>
+  </p:notesStyle>
+</p:notesMaster>
+</file>
+
+<file path=ppt/notesSlides/notesSlide1.xml><?xml version="1.0" encoding="utf-8"?>
+<p:notes xmlns:a="http://schemas.openxmlformats.org/drawingml/2006/main" xmlns:r="http://schemas.openxmlformats.org/officeDocument/2006/relationships" xmlns:p="http://schemas.openxmlformats.org/presentationml/2006/main">
+  <p:cSld>
+    <p:spTree>
+      <p:nvGrpSpPr>
+        <p:cNvPr id="1" name=""/>
+        <p:cNvGrpSpPr/>
+        <p:nvPr/>
+      </p:nvGrpSpPr>
+      <p:grpSpPr>
+        <a:xfrm>
+          <a:off x="0" y="0"/>
+          <a:ext cx="0" cy="0"/>
+          <a:chOff x="0" y="0"/>
+          <a:chExt cx="0" cy="0"/>
+        </a:xfrm>
+      </p:grpSpPr>
+      <p:sp>
+        <p:nvSpPr>
+          <p:cNvPr id="2" name="Slide Image Placeholder 1"/>
+          <p:cNvSpPr>
+            <a:spLocks noGrp="1" noRot="1" noChangeAspect="1"/>
+          </p:cNvSpPr>
+          <p:nvPr>
+            <p:ph type="sldImg"/>
+          </p:nvPr>
+        </p:nvSpPr>
+        <p:spPr/>
+      </p:sp>
+      <p:sp>
+        <p:nvSpPr>
+          <p:cNvPr id="3" name="Notes Placeholder 2"/>
+          <p:cNvSpPr>
+            <a:spLocks noGrp="1"/>
+          </p:cNvSpPr>
+          <p:nvPr>
+            <p:ph type="body" idx="1"/>
+          </p:nvPr>
+        </p:nvSpPr>
+        <p:spPr/>
+        <p:txBody>
+          <a:bodyPr/>
+          <a:lstStyle/>
+          <a:p>
+            <a:endParaRPr lang="fr-CA" dirty="0"/>
+          </a:p>
+        </p:txBody>
+      </p:sp>
+      <p:sp>
+        <p:nvSpPr>
+          <p:cNvPr id="4" name="Slide Number Placeholder 3"/>
+          <p:cNvSpPr>
+            <a:spLocks noGrp="1"/>
+          </p:cNvSpPr>
+          <p:nvPr>
+            <p:ph type="sldNum" sz="quarter" idx="5"/>
+          </p:nvPr>
+        </p:nvSpPr>
+        <p:spPr/>
+        <p:txBody>
+          <a:bodyPr/>
+          <a:lstStyle/>
+          <a:p>
+            <a:fld id="{DC469113-9F80-4FF7-8D09-31083FF4FEEC}" type="slidenum">
+              <a:rPr lang="fr-CA" smtClean="0"/>
+              <a:t>12</a:t>
+            </a:fld>
+            <a:endParaRPr lang="fr-CA"/>
+          </a:p>
+        </p:txBody>
+      </p:sp>
+    </p:spTree>
+    <p:extLst>
+      <p:ext uri="{BB962C8B-B14F-4D97-AF65-F5344CB8AC3E}">
+        <p14:creationId xmlns:p14="http://schemas.microsoft.com/office/powerpoint/2010/main" val="3448252214"/>
+      </p:ext>
+    </p:extLst>
+  </p:cSld>
+  <p:clrMapOvr>
+    <a:masterClrMapping/>
+  </p:clrMapOvr>
+</p:notes>
+</file>
+
 <file path=ppt/slideLayouts/slideLayout1.xml><?xml version="1.0" encoding="utf-8"?>
 <p:sldLayout xmlns:a="http://schemas.openxmlformats.org/drawingml/2006/main" xmlns:r="http://schemas.openxmlformats.org/officeDocument/2006/relationships" xmlns:p="http://schemas.openxmlformats.org/presentationml/2006/main" type="title" preserve="1">
   <p:cSld name="Title Slide">
@@ -280,7 +719,7 @@
           <a:p>
             <a:fld id="{0F77A28A-3D95-4505-B6A9-5725374991B4}" type="datetimeFigureOut">
               <a:rPr lang="fr-CA" smtClean="0"/>
-              <a:t>2024-09-18</a:t>
+              <a:t>2024-09-25</a:t>
             </a:fld>
             <a:endParaRPr lang="fr-CA"/>
           </a:p>
@@ -480,7 +919,7 @@
           <a:p>
             <a:fld id="{0F77A28A-3D95-4505-B6A9-5725374991B4}" type="datetimeFigureOut">
               <a:rPr lang="fr-CA" smtClean="0"/>
-              <a:t>2024-09-18</a:t>
+              <a:t>2024-09-25</a:t>
             </a:fld>
             <a:endParaRPr lang="fr-CA"/>
           </a:p>
@@ -690,7 +1129,7 @@
           <a:p>
             <a:fld id="{0F77A28A-3D95-4505-B6A9-5725374991B4}" type="datetimeFigureOut">
               <a:rPr lang="fr-CA" smtClean="0"/>
-              <a:t>2024-09-18</a:t>
+              <a:t>2024-09-25</a:t>
             </a:fld>
             <a:endParaRPr lang="fr-CA"/>
           </a:p>
@@ -890,7 +1329,7 @@
           <a:p>
             <a:fld id="{0F77A28A-3D95-4505-B6A9-5725374991B4}" type="datetimeFigureOut">
               <a:rPr lang="fr-CA" smtClean="0"/>
-              <a:t>2024-09-18</a:t>
+              <a:t>2024-09-25</a:t>
             </a:fld>
             <a:endParaRPr lang="fr-CA"/>
           </a:p>
@@ -1166,7 +1605,7 @@
           <a:p>
             <a:fld id="{0F77A28A-3D95-4505-B6A9-5725374991B4}" type="datetimeFigureOut">
               <a:rPr lang="fr-CA" smtClean="0"/>
-              <a:t>2024-09-18</a:t>
+              <a:t>2024-09-25</a:t>
             </a:fld>
             <a:endParaRPr lang="fr-CA"/>
           </a:p>
@@ -1434,7 +1873,7 @@
           <a:p>
             <a:fld id="{0F77A28A-3D95-4505-B6A9-5725374991B4}" type="datetimeFigureOut">
               <a:rPr lang="fr-CA" smtClean="0"/>
-              <a:t>2024-09-18</a:t>
+              <a:t>2024-09-25</a:t>
             </a:fld>
             <a:endParaRPr lang="fr-CA"/>
           </a:p>
@@ -1849,7 +2288,7 @@
           <a:p>
             <a:fld id="{0F77A28A-3D95-4505-B6A9-5725374991B4}" type="datetimeFigureOut">
               <a:rPr lang="fr-CA" smtClean="0"/>
-              <a:t>2024-09-18</a:t>
+              <a:t>2024-09-25</a:t>
             </a:fld>
             <a:endParaRPr lang="fr-CA"/>
           </a:p>
@@ -1991,7 +2430,7 @@
           <a:p>
             <a:fld id="{0F77A28A-3D95-4505-B6A9-5725374991B4}" type="datetimeFigureOut">
               <a:rPr lang="fr-CA" smtClean="0"/>
-              <a:t>2024-09-18</a:t>
+              <a:t>2024-09-25</a:t>
             </a:fld>
             <a:endParaRPr lang="fr-CA"/>
           </a:p>
@@ -2104,7 +2543,7 @@
           <a:p>
             <a:fld id="{0F77A28A-3D95-4505-B6A9-5725374991B4}" type="datetimeFigureOut">
               <a:rPr lang="fr-CA" smtClean="0"/>
-              <a:t>2024-09-18</a:t>
+              <a:t>2024-09-25</a:t>
             </a:fld>
             <a:endParaRPr lang="fr-CA"/>
           </a:p>
@@ -2417,7 +2856,7 @@
           <a:p>
             <a:fld id="{0F77A28A-3D95-4505-B6A9-5725374991B4}" type="datetimeFigureOut">
               <a:rPr lang="fr-CA" smtClean="0"/>
-              <a:t>2024-09-18</a:t>
+              <a:t>2024-09-25</a:t>
             </a:fld>
             <a:endParaRPr lang="fr-CA"/>
           </a:p>
@@ -2706,7 +3145,7 @@
           <a:p>
             <a:fld id="{0F77A28A-3D95-4505-B6A9-5725374991B4}" type="datetimeFigureOut">
               <a:rPr lang="fr-CA" smtClean="0"/>
-              <a:t>2024-09-18</a:t>
+              <a:t>2024-09-25</a:t>
             </a:fld>
             <a:endParaRPr lang="fr-CA"/>
           </a:p>
@@ -2949,7 +3388,7 @@
           <a:p>
             <a:fld id="{0F77A28A-3D95-4505-B6A9-5725374991B4}" type="datetimeFigureOut">
               <a:rPr lang="fr-CA" smtClean="0"/>
-              <a:t>2024-09-18</a:t>
+              <a:t>2024-09-25</a:t>
             </a:fld>
             <a:endParaRPr lang="fr-CA"/>
           </a:p>
@@ -8240,10 +8679,10 @@
       </p:grpSpPr>
       <p:sp>
         <p:nvSpPr>
-          <p:cNvPr id="2" name="Flowchart: Manual Operation 1">
-            <a:extLst>
-              <a:ext uri="{FF2B5EF4-FFF2-40B4-BE49-F238E27FC236}">
-                <a16:creationId xmlns:a16="http://schemas.microsoft.com/office/drawing/2014/main" id="{58C3442A-6B31-E22A-33A3-7CF67365E020}"/>
+          <p:cNvPr id="4" name="Flowchart: Manual Operation 3">
+            <a:extLst>
+              <a:ext uri="{FF2B5EF4-FFF2-40B4-BE49-F238E27FC236}">
+                <a16:creationId xmlns:a16="http://schemas.microsoft.com/office/drawing/2014/main" id="{428D9DFE-C81A-79AF-B707-CF0AFBFF48D2}"/>
               </a:ext>
             </a:extLst>
           </p:cNvPr>
@@ -8284,6 +8723,1038 @@
           </a:p>
         </p:txBody>
       </p:sp>
+      <mc:AlternateContent xmlns:mc="http://schemas.openxmlformats.org/markup-compatibility/2006">
+        <mc:Choice xmlns:a14="http://schemas.microsoft.com/office/drawing/2010/main" Requires="a14">
+          <p:sp>
+            <p:nvSpPr>
+              <p:cNvPr id="5" name="Cube 4">
+                <a:extLst>
+                  <a:ext uri="{FF2B5EF4-FFF2-40B4-BE49-F238E27FC236}">
+                    <a16:creationId xmlns:a16="http://schemas.microsoft.com/office/drawing/2014/main" id="{95D73351-0DF1-155C-53FB-F933F25C936C}"/>
+                  </a:ext>
+                </a:extLst>
+              </p:cNvPr>
+              <p:cNvSpPr/>
+              <p:nvPr/>
+            </p:nvSpPr>
+            <p:spPr>
+              <a:xfrm>
+                <a:off x="3795252" y="2369574"/>
+                <a:ext cx="3991897" cy="1592826"/>
+              </a:xfrm>
+              <a:prstGeom prst="cube">
+                <a:avLst/>
+              </a:prstGeom>
+            </p:spPr>
+            <p:style>
+              <a:lnRef idx="2">
+                <a:schemeClr val="accent1">
+                  <a:shade val="15000"/>
+                </a:schemeClr>
+              </a:lnRef>
+              <a:fillRef idx="1">
+                <a:schemeClr val="accent1"/>
+              </a:fillRef>
+              <a:effectRef idx="0">
+                <a:schemeClr val="accent1"/>
+              </a:effectRef>
+              <a:fontRef idx="minor">
+                <a:schemeClr val="lt1"/>
+              </a:fontRef>
+            </p:style>
+            <p:txBody>
+              <a:bodyPr rtlCol="0" anchor="ctr"/>
+              <a:lstStyle/>
+              <a:p>
+                <a:pPr algn="ctr"/>
+                <a14:m>
+                  <m:oMathPara xmlns:m="http://schemas.openxmlformats.org/officeDocument/2006/math">
+                    <m:oMathParaPr>
+                      <m:jc m:val="centerGroup"/>
+                    </m:oMathParaPr>
+                    <m:oMath xmlns:m="http://schemas.openxmlformats.org/officeDocument/2006/math">
+                      <m:r>
+                        <a:rPr lang="en-US" sz="3200" b="0" i="1" dirty="0" smtClean="0">
+                          <a:latin typeface="Cambria Math" panose="02040503050406030204" pitchFamily="18" charset="0"/>
+                        </a:rPr>
+                        <m:t>𝑓</m:t>
+                      </m:r>
+                      <m:d>
+                        <m:dPr>
+                          <m:ctrlPr>
+                            <a:rPr lang="en-US" sz="3200" b="0" i="1" dirty="0" smtClean="0">
+                              <a:latin typeface="Cambria Math" panose="02040503050406030204" pitchFamily="18" charset="0"/>
+                            </a:rPr>
+                          </m:ctrlPr>
+                        </m:dPr>
+                        <m:e>
+                          <m:r>
+                            <a:rPr lang="en-US" sz="3200" b="0" i="1" dirty="0" smtClean="0">
+                              <a:latin typeface="Cambria Math" panose="02040503050406030204" pitchFamily="18" charset="0"/>
+                            </a:rPr>
+                            <m:t>𝑥</m:t>
+                          </m:r>
+                        </m:e>
+                      </m:d>
+                      <m:r>
+                        <a:rPr lang="en-US" sz="3200" b="0" i="1" dirty="0" smtClean="0">
+                          <a:latin typeface="Cambria Math" panose="02040503050406030204" pitchFamily="18" charset="0"/>
+                        </a:rPr>
+                        <m:t>=</m:t>
+                      </m:r>
+                      <m:sSup>
+                        <m:sSupPr>
+                          <m:ctrlPr>
+                            <a:rPr lang="en-US" sz="3200" b="0" i="1" dirty="0" smtClean="0">
+                              <a:latin typeface="Cambria Math" panose="02040503050406030204" pitchFamily="18" charset="0"/>
+                            </a:rPr>
+                          </m:ctrlPr>
+                        </m:sSupPr>
+                        <m:e>
+                          <m:r>
+                            <a:rPr lang="en-US" sz="3200" b="0" i="1" dirty="0" smtClean="0">
+                              <a:latin typeface="Cambria Math" panose="02040503050406030204" pitchFamily="18" charset="0"/>
+                            </a:rPr>
+                            <m:t>𝑥</m:t>
+                          </m:r>
+                        </m:e>
+                        <m:sup>
+                          <m:r>
+                            <a:rPr lang="en-US" sz="3200" b="0" i="1" dirty="0" smtClean="0">
+                              <a:latin typeface="Cambria Math" panose="02040503050406030204" pitchFamily="18" charset="0"/>
+                            </a:rPr>
+                            <m:t>2</m:t>
+                          </m:r>
+                        </m:sup>
+                      </m:sSup>
+                    </m:oMath>
+                  </m:oMathPara>
+                </a14:m>
+                <a:endParaRPr lang="fr-CA" dirty="0"/>
+              </a:p>
+            </p:txBody>
+          </p:sp>
+        </mc:Choice>
+        <mc:Fallback>
+          <p:sp>
+            <p:nvSpPr>
+              <p:cNvPr id="5" name="Cube 4">
+                <a:extLst>
+                  <a:ext uri="{FF2B5EF4-FFF2-40B4-BE49-F238E27FC236}">
+                    <a16:creationId xmlns:a16="http://schemas.microsoft.com/office/drawing/2014/main" id="{95D73351-0DF1-155C-53FB-F933F25C936C}"/>
+                  </a:ext>
+                </a:extLst>
+              </p:cNvPr>
+              <p:cNvSpPr>
+                <a:spLocks noRot="1" noChangeAspect="1" noMove="1" noResize="1" noEditPoints="1" noAdjustHandles="1" noChangeArrowheads="1" noChangeShapeType="1" noTextEdit="1"/>
+              </p:cNvSpPr>
+              <p:nvPr/>
+            </p:nvSpPr>
+            <p:spPr>
+              <a:xfrm>
+                <a:off x="3795252" y="2369574"/>
+                <a:ext cx="3991897" cy="1592826"/>
+              </a:xfrm>
+              <a:prstGeom prst="cube">
+                <a:avLst/>
+              </a:prstGeom>
+              <a:blipFill>
+                <a:blip r:embed="rId2"/>
+                <a:stretch>
+                  <a:fillRect/>
+                </a:stretch>
+              </a:blipFill>
+            </p:spPr>
+            <p:txBody>
+              <a:bodyPr/>
+              <a:lstStyle/>
+              <a:p>
+                <a:r>
+                  <a:rPr lang="fr-CA">
+                    <a:noFill/>
+                  </a:rPr>
+                  <a:t> </a:t>
+                </a:r>
+              </a:p>
+            </p:txBody>
+          </p:sp>
+        </mc:Fallback>
+      </mc:AlternateContent>
+      <p:sp>
+        <p:nvSpPr>
+          <p:cNvPr id="6" name="Flowchart: Manual Operation 5">
+            <a:extLst>
+              <a:ext uri="{FF2B5EF4-FFF2-40B4-BE49-F238E27FC236}">
+                <a16:creationId xmlns:a16="http://schemas.microsoft.com/office/drawing/2014/main" id="{8E265F03-3F84-1FF1-36E2-E3437471225B}"/>
+              </a:ext>
+            </a:extLst>
+          </p:cNvPr>
+          <p:cNvSpPr/>
+          <p:nvPr/>
+        </p:nvSpPr>
+        <p:spPr>
+          <a:xfrm>
+            <a:off x="4119716" y="1897625"/>
+            <a:ext cx="796413" cy="766916"/>
+          </a:xfrm>
+          <a:prstGeom prst="flowChartManualOperation">
+            <a:avLst/>
+          </a:prstGeom>
+        </p:spPr>
+        <p:style>
+          <a:lnRef idx="2">
+            <a:schemeClr val="accent1">
+              <a:shade val="15000"/>
+            </a:schemeClr>
+          </a:lnRef>
+          <a:fillRef idx="1">
+            <a:schemeClr val="accent1"/>
+          </a:fillRef>
+          <a:effectRef idx="0">
+            <a:schemeClr val="accent1"/>
+          </a:effectRef>
+          <a:fontRef idx="minor">
+            <a:schemeClr val="lt1"/>
+          </a:fontRef>
+        </p:style>
+        <p:txBody>
+          <a:bodyPr rtlCol="0" anchor="ctr"/>
+          <a:lstStyle/>
+          <a:p>
+            <a:pPr algn="ctr"/>
+            <a:endParaRPr lang="fr-CA"/>
+          </a:p>
+        </p:txBody>
+      </p:sp>
+      <p:sp>
+        <p:nvSpPr>
+          <p:cNvPr id="7" name="TextBox 6">
+            <a:extLst>
+              <a:ext uri="{FF2B5EF4-FFF2-40B4-BE49-F238E27FC236}">
+                <a16:creationId xmlns:a16="http://schemas.microsoft.com/office/drawing/2014/main" id="{6641239C-EE2F-7A9F-B25A-D1D4367E8761}"/>
+              </a:ext>
+            </a:extLst>
+          </p:cNvPr>
+          <p:cNvSpPr txBox="1"/>
+          <p:nvPr/>
+        </p:nvSpPr>
+        <p:spPr>
+          <a:xfrm>
+            <a:off x="4100049" y="1158971"/>
+            <a:ext cx="491613" cy="523220"/>
+          </a:xfrm>
+          <a:prstGeom prst="rect">
+            <a:avLst/>
+          </a:prstGeom>
+          <a:noFill/>
+        </p:spPr>
+        <p:txBody>
+          <a:bodyPr wrap="square" rtlCol="0">
+            <a:spAutoFit/>
+          </a:bodyPr>
+          <a:lstStyle/>
+          <a:p>
+            <a:r>
+              <a:rPr lang="en-US" sz="2800" b="1" dirty="0">
+                <a:ln w="9525">
+                  <a:solidFill>
+                    <a:schemeClr val="bg1"/>
+                  </a:solidFill>
+                  <a:prstDash val="solid"/>
+                </a:ln>
+                <a:effectLst>
+                  <a:outerShdw blurRad="12700" dist="38100" dir="2700000" algn="tl" rotWithShape="0">
+                    <a:schemeClr val="bg1">
+                      <a:lumMod val="50000"/>
+                    </a:schemeClr>
+                  </a:outerShdw>
+                </a:effectLst>
+              </a:rPr>
+              <a:t>2</a:t>
+            </a:r>
+            <a:endParaRPr lang="fr-CA" b="1" dirty="0">
+              <a:ln w="9525">
+                <a:solidFill>
+                  <a:schemeClr val="bg1"/>
+                </a:solidFill>
+                <a:prstDash val="solid"/>
+              </a:ln>
+              <a:effectLst>
+                <a:outerShdw blurRad="12700" dist="38100" dir="2700000" algn="tl" rotWithShape="0">
+                  <a:schemeClr val="bg1">
+                    <a:lumMod val="50000"/>
+                  </a:schemeClr>
+                </a:outerShdw>
+              </a:effectLst>
+            </a:endParaRPr>
+          </a:p>
+        </p:txBody>
+      </p:sp>
+      <p:sp>
+        <p:nvSpPr>
+          <p:cNvPr id="8" name="TextBox 7">
+            <a:extLst>
+              <a:ext uri="{FF2B5EF4-FFF2-40B4-BE49-F238E27FC236}">
+                <a16:creationId xmlns:a16="http://schemas.microsoft.com/office/drawing/2014/main" id="{4A602A80-1B95-9D22-65FF-5EDA5B81C6C7}"/>
+              </a:ext>
+            </a:extLst>
+          </p:cNvPr>
+          <p:cNvSpPr txBox="1"/>
+          <p:nvPr/>
+        </p:nvSpPr>
+        <p:spPr>
+          <a:xfrm>
+            <a:off x="4272115" y="876821"/>
+            <a:ext cx="491613" cy="523220"/>
+          </a:xfrm>
+          <a:prstGeom prst="rect">
+            <a:avLst/>
+          </a:prstGeom>
+          <a:noFill/>
+        </p:spPr>
+        <p:txBody>
+          <a:bodyPr wrap="square" rtlCol="0">
+            <a:spAutoFit/>
+          </a:bodyPr>
+          <a:lstStyle/>
+          <a:p>
+            <a:r>
+              <a:rPr lang="en-US" sz="2800" b="1" dirty="0">
+                <a:ln w="9525">
+                  <a:solidFill>
+                    <a:schemeClr val="bg1"/>
+                  </a:solidFill>
+                  <a:prstDash val="solid"/>
+                </a:ln>
+                <a:effectLst>
+                  <a:outerShdw blurRad="12700" dist="38100" dir="2700000" algn="tl" rotWithShape="0">
+                    <a:schemeClr val="bg1">
+                      <a:lumMod val="50000"/>
+                    </a:schemeClr>
+                  </a:outerShdw>
+                </a:effectLst>
+              </a:rPr>
+              <a:t>3</a:t>
+            </a:r>
+            <a:endParaRPr lang="fr-CA" b="1" dirty="0">
+              <a:ln w="9525">
+                <a:solidFill>
+                  <a:schemeClr val="bg1"/>
+                </a:solidFill>
+                <a:prstDash val="solid"/>
+              </a:ln>
+              <a:effectLst>
+                <a:outerShdw blurRad="12700" dist="38100" dir="2700000" algn="tl" rotWithShape="0">
+                  <a:schemeClr val="bg1">
+                    <a:lumMod val="50000"/>
+                  </a:schemeClr>
+                </a:outerShdw>
+              </a:effectLst>
+            </a:endParaRPr>
+          </a:p>
+        </p:txBody>
+      </p:sp>
+      <p:sp>
+        <p:nvSpPr>
+          <p:cNvPr id="9" name="TextBox 8">
+            <a:extLst>
+              <a:ext uri="{FF2B5EF4-FFF2-40B4-BE49-F238E27FC236}">
+                <a16:creationId xmlns:a16="http://schemas.microsoft.com/office/drawing/2014/main" id="{70EA2C23-7318-163E-6D44-CA2818C6D2A3}"/>
+              </a:ext>
+            </a:extLst>
+          </p:cNvPr>
+          <p:cNvSpPr txBox="1"/>
+          <p:nvPr/>
+        </p:nvSpPr>
+        <p:spPr>
+          <a:xfrm>
+            <a:off x="4444181" y="1282054"/>
+            <a:ext cx="491613" cy="523220"/>
+          </a:xfrm>
+          <a:prstGeom prst="rect">
+            <a:avLst/>
+          </a:prstGeom>
+          <a:noFill/>
+        </p:spPr>
+        <p:txBody>
+          <a:bodyPr wrap="square" rtlCol="0">
+            <a:spAutoFit/>
+          </a:bodyPr>
+          <a:lstStyle/>
+          <a:p>
+            <a:r>
+              <a:rPr lang="en-US" sz="2800" b="1" dirty="0">
+                <a:ln w="9525">
+                  <a:solidFill>
+                    <a:schemeClr val="bg1"/>
+                  </a:solidFill>
+                  <a:prstDash val="solid"/>
+                </a:ln>
+                <a:effectLst>
+                  <a:outerShdw blurRad="12700" dist="38100" dir="2700000" algn="tl" rotWithShape="0">
+                    <a:schemeClr val="bg1">
+                      <a:lumMod val="50000"/>
+                    </a:schemeClr>
+                  </a:outerShdw>
+                </a:effectLst>
+              </a:rPr>
+              <a:t>4</a:t>
+            </a:r>
+            <a:endParaRPr lang="fr-CA" b="1" dirty="0">
+              <a:ln w="9525">
+                <a:solidFill>
+                  <a:schemeClr val="bg1"/>
+                </a:solidFill>
+                <a:prstDash val="solid"/>
+              </a:ln>
+              <a:effectLst>
+                <a:outerShdw blurRad="12700" dist="38100" dir="2700000" algn="tl" rotWithShape="0">
+                  <a:schemeClr val="bg1">
+                    <a:lumMod val="50000"/>
+                  </a:schemeClr>
+                </a:outerShdw>
+              </a:effectLst>
+            </a:endParaRPr>
+          </a:p>
+        </p:txBody>
+      </p:sp>
+      <p:sp>
+        <p:nvSpPr>
+          <p:cNvPr id="10" name="TextBox 9">
+            <a:extLst>
+              <a:ext uri="{FF2B5EF4-FFF2-40B4-BE49-F238E27FC236}">
+                <a16:creationId xmlns:a16="http://schemas.microsoft.com/office/drawing/2014/main" id="{67FC864D-7403-DD9C-44D1-5EF7294B7F8C}"/>
+              </a:ext>
+            </a:extLst>
+          </p:cNvPr>
+          <p:cNvSpPr txBox="1"/>
+          <p:nvPr/>
+        </p:nvSpPr>
+        <p:spPr>
+          <a:xfrm>
+            <a:off x="6941572" y="4670323"/>
+            <a:ext cx="491613" cy="523220"/>
+          </a:xfrm>
+          <a:prstGeom prst="rect">
+            <a:avLst/>
+          </a:prstGeom>
+          <a:noFill/>
+        </p:spPr>
+        <p:txBody>
+          <a:bodyPr wrap="square" rtlCol="0">
+            <a:spAutoFit/>
+          </a:bodyPr>
+          <a:lstStyle/>
+          <a:p>
+            <a:r>
+              <a:rPr lang="en-US" sz="2800" b="1" dirty="0">
+                <a:ln w="9525">
+                  <a:solidFill>
+                    <a:schemeClr val="bg1"/>
+                  </a:solidFill>
+                  <a:prstDash val="solid"/>
+                </a:ln>
+                <a:effectLst>
+                  <a:outerShdw blurRad="12700" dist="38100" dir="2700000" algn="tl" rotWithShape="0">
+                    <a:schemeClr val="bg1">
+                      <a:lumMod val="50000"/>
+                    </a:schemeClr>
+                  </a:outerShdw>
+                </a:effectLst>
+              </a:rPr>
+              <a:t>4</a:t>
+            </a:r>
+            <a:endParaRPr lang="fr-CA" b="1" dirty="0">
+              <a:ln w="9525">
+                <a:solidFill>
+                  <a:schemeClr val="bg1"/>
+                </a:solidFill>
+                <a:prstDash val="solid"/>
+              </a:ln>
+              <a:effectLst>
+                <a:outerShdw blurRad="12700" dist="38100" dir="2700000" algn="tl" rotWithShape="0">
+                  <a:schemeClr val="bg1">
+                    <a:lumMod val="50000"/>
+                  </a:schemeClr>
+                </a:outerShdw>
+              </a:effectLst>
+            </a:endParaRPr>
+          </a:p>
+        </p:txBody>
+      </p:sp>
+      <p:sp>
+        <p:nvSpPr>
+          <p:cNvPr id="11" name="TextBox 10">
+            <a:extLst>
+              <a:ext uri="{FF2B5EF4-FFF2-40B4-BE49-F238E27FC236}">
+                <a16:creationId xmlns:a16="http://schemas.microsoft.com/office/drawing/2014/main" id="{17A66AF8-3ED6-1506-C67D-C7840C20F7F2}"/>
+              </a:ext>
+            </a:extLst>
+          </p:cNvPr>
+          <p:cNvSpPr txBox="1"/>
+          <p:nvPr/>
+        </p:nvSpPr>
+        <p:spPr>
+          <a:xfrm>
+            <a:off x="7113638" y="4388173"/>
+            <a:ext cx="491613" cy="523220"/>
+          </a:xfrm>
+          <a:prstGeom prst="rect">
+            <a:avLst/>
+          </a:prstGeom>
+          <a:noFill/>
+        </p:spPr>
+        <p:txBody>
+          <a:bodyPr wrap="square" rtlCol="0">
+            <a:spAutoFit/>
+          </a:bodyPr>
+          <a:lstStyle/>
+          <a:p>
+            <a:r>
+              <a:rPr lang="en-US" sz="2800" b="1" dirty="0">
+                <a:ln w="9525">
+                  <a:solidFill>
+                    <a:schemeClr val="bg1"/>
+                  </a:solidFill>
+                  <a:prstDash val="solid"/>
+                </a:ln>
+                <a:effectLst>
+                  <a:outerShdw blurRad="12700" dist="38100" dir="2700000" algn="tl" rotWithShape="0">
+                    <a:schemeClr val="bg1">
+                      <a:lumMod val="50000"/>
+                    </a:schemeClr>
+                  </a:outerShdw>
+                </a:effectLst>
+              </a:rPr>
+              <a:t>9</a:t>
+            </a:r>
+            <a:endParaRPr lang="fr-CA" b="1" dirty="0">
+              <a:ln w="9525">
+                <a:solidFill>
+                  <a:schemeClr val="bg1"/>
+                </a:solidFill>
+                <a:prstDash val="solid"/>
+              </a:ln>
+              <a:effectLst>
+                <a:outerShdw blurRad="12700" dist="38100" dir="2700000" algn="tl" rotWithShape="0">
+                  <a:schemeClr val="bg1">
+                    <a:lumMod val="50000"/>
+                  </a:schemeClr>
+                </a:outerShdw>
+              </a:effectLst>
+            </a:endParaRPr>
+          </a:p>
+        </p:txBody>
+      </p:sp>
+      <p:sp>
+        <p:nvSpPr>
+          <p:cNvPr id="12" name="TextBox 11">
+            <a:extLst>
+              <a:ext uri="{FF2B5EF4-FFF2-40B4-BE49-F238E27FC236}">
+                <a16:creationId xmlns:a16="http://schemas.microsoft.com/office/drawing/2014/main" id="{8569A8FA-F8CC-B401-6C20-9AC189A32389}"/>
+              </a:ext>
+            </a:extLst>
+          </p:cNvPr>
+          <p:cNvSpPr txBox="1"/>
+          <p:nvPr/>
+        </p:nvSpPr>
+        <p:spPr>
+          <a:xfrm>
+            <a:off x="7295536" y="4670323"/>
+            <a:ext cx="648929" cy="523220"/>
+          </a:xfrm>
+          <a:prstGeom prst="rect">
+            <a:avLst/>
+          </a:prstGeom>
+          <a:noFill/>
+        </p:spPr>
+        <p:txBody>
+          <a:bodyPr wrap="square" rtlCol="0">
+            <a:spAutoFit/>
+          </a:bodyPr>
+          <a:lstStyle/>
+          <a:p>
+            <a:r>
+              <a:rPr lang="en-US" sz="2800" b="1" dirty="0">
+                <a:ln w="9525">
+                  <a:solidFill>
+                    <a:schemeClr val="bg1"/>
+                  </a:solidFill>
+                  <a:prstDash val="solid"/>
+                </a:ln>
+                <a:effectLst>
+                  <a:outerShdw blurRad="12700" dist="38100" dir="2700000" algn="tl" rotWithShape="0">
+                    <a:schemeClr val="bg1">
+                      <a:lumMod val="50000"/>
+                    </a:schemeClr>
+                  </a:outerShdw>
+                </a:effectLst>
+              </a:rPr>
+              <a:t>16</a:t>
+            </a:r>
+            <a:endParaRPr lang="fr-CA" b="1" dirty="0">
+              <a:ln w="9525">
+                <a:solidFill>
+                  <a:schemeClr val="bg1"/>
+                </a:solidFill>
+                <a:prstDash val="solid"/>
+              </a:ln>
+              <a:effectLst>
+                <a:outerShdw blurRad="12700" dist="38100" dir="2700000" algn="tl" rotWithShape="0">
+                  <a:schemeClr val="bg1">
+                    <a:lumMod val="50000"/>
+                  </a:schemeClr>
+                </a:outerShdw>
+              </a:effectLst>
+            </a:endParaRPr>
+          </a:p>
+        </p:txBody>
+      </p:sp>
+      <p:sp>
+        <p:nvSpPr>
+          <p:cNvPr id="13" name="TextBox 12">
+            <a:extLst>
+              <a:ext uri="{FF2B5EF4-FFF2-40B4-BE49-F238E27FC236}">
+                <a16:creationId xmlns:a16="http://schemas.microsoft.com/office/drawing/2014/main" id="{5F51B3DD-5AEE-9B8C-F18B-FEA3142BB177}"/>
+              </a:ext>
+            </a:extLst>
+          </p:cNvPr>
+          <p:cNvSpPr txBox="1"/>
+          <p:nvPr/>
+        </p:nvSpPr>
+        <p:spPr>
+          <a:xfrm>
+            <a:off x="4059689" y="440773"/>
+            <a:ext cx="704039" cy="369332"/>
+          </a:xfrm>
+          <a:prstGeom prst="rect">
+            <a:avLst/>
+          </a:prstGeom>
+          <a:noFill/>
+        </p:spPr>
+        <p:txBody>
+          <a:bodyPr wrap="none" rtlCol="0">
+            <a:spAutoFit/>
+          </a:bodyPr>
+          <a:lstStyle/>
+          <a:p>
+            <a:r>
+              <a:rPr lang="en-US" dirty="0"/>
+              <a:t>Input</a:t>
+            </a:r>
+            <a:endParaRPr lang="fr-CA" dirty="0"/>
+          </a:p>
+        </p:txBody>
+      </p:sp>
+      <p:sp>
+        <p:nvSpPr>
+          <p:cNvPr id="14" name="TextBox 13">
+            <a:extLst>
+              <a:ext uri="{FF2B5EF4-FFF2-40B4-BE49-F238E27FC236}">
+                <a16:creationId xmlns:a16="http://schemas.microsoft.com/office/drawing/2014/main" id="{6C8FD326-7D58-3248-1898-F376B91EF1B4}"/>
+              </a:ext>
+            </a:extLst>
+          </p:cNvPr>
+          <p:cNvSpPr txBox="1"/>
+          <p:nvPr/>
+        </p:nvSpPr>
+        <p:spPr>
+          <a:xfrm>
+            <a:off x="6988191" y="5142272"/>
+            <a:ext cx="889987" cy="369332"/>
+          </a:xfrm>
+          <a:prstGeom prst="rect">
+            <a:avLst/>
+          </a:prstGeom>
+          <a:noFill/>
+        </p:spPr>
+        <p:txBody>
+          <a:bodyPr wrap="none" rtlCol="0">
+            <a:spAutoFit/>
+          </a:bodyPr>
+          <a:lstStyle/>
+          <a:p>
+            <a:r>
+              <a:rPr lang="en-US" dirty="0"/>
+              <a:t>Output</a:t>
+            </a:r>
+            <a:endParaRPr lang="fr-CA" dirty="0"/>
+          </a:p>
+        </p:txBody>
+      </p:sp>
+    </p:spTree>
+    <p:extLst>
+      <p:ext uri="{BB962C8B-B14F-4D97-AF65-F5344CB8AC3E}">
+        <p14:creationId xmlns:p14="http://schemas.microsoft.com/office/powerpoint/2010/main" val="729865443"/>
+      </p:ext>
+    </p:extLst>
+  </p:cSld>
+  <p:clrMapOvr>
+    <a:masterClrMapping/>
+  </p:clrMapOvr>
+</p:sld>
+</file>
+
+<file path=ppt/slides/slide12.xml><?xml version="1.0" encoding="utf-8"?>
+<p:sld xmlns:a="http://schemas.openxmlformats.org/drawingml/2006/main" xmlns:r="http://schemas.openxmlformats.org/officeDocument/2006/relationships" xmlns:p="http://schemas.openxmlformats.org/presentationml/2006/main">
+  <p:cSld>
+    <p:bg>
+      <p:bgPr>
+        <a:solidFill>
+          <a:schemeClr val="bg1"/>
+        </a:solidFill>
+        <a:effectLst/>
+      </p:bgPr>
+    </p:bg>
+    <p:spTree>
+      <p:nvGrpSpPr>
+        <p:cNvPr id="1" name=""/>
+        <p:cNvGrpSpPr/>
+        <p:nvPr/>
+      </p:nvGrpSpPr>
+      <p:grpSpPr>
+        <a:xfrm>
+          <a:off x="0" y="0"/>
+          <a:ext cx="0" cy="0"/>
+          <a:chOff x="0" y="0"/>
+          <a:chExt cx="0" cy="0"/>
+        </a:xfrm>
+      </p:grpSpPr>
+      <p:sp>
+        <p:nvSpPr>
+          <p:cNvPr id="14" name="Rectangle 13">
+            <a:extLst>
+              <a:ext uri="{FF2B5EF4-FFF2-40B4-BE49-F238E27FC236}">
+                <a16:creationId xmlns:a16="http://schemas.microsoft.com/office/drawing/2014/main" id="{0205D939-00C4-4F2E-9797-3170DD040D90}"/>
+              </a:ext>
+              <a:ext uri="{C183D7F6-B498-43B3-948B-1728B52AA6E4}">
+                <adec:decorative xmlns:adec="http://schemas.microsoft.com/office/drawing/2017/decorative" val="1"/>
+              </a:ext>
+            </a:extLst>
+          </p:cNvPr>
+          <p:cNvSpPr>
+            <a:spLocks noGrp="1" noRot="1" noChangeAspect="1" noMove="1" noResize="1" noEditPoints="1" noAdjustHandles="1" noChangeArrowheads="1" noChangeShapeType="1" noTextEdit="1"/>
+          </p:cNvSpPr>
+          <p:nvPr>
+            <p:extLst>
+              <p:ext uri="{386F3935-93C4-4BCD-93E2-E3B085C9AB24}">
+                <p16:designElem xmlns:p16="http://schemas.microsoft.com/office/powerpoint/2015/main" val="1"/>
+              </p:ext>
+            </p:extLst>
+          </p:nvPr>
+        </p:nvSpPr>
+        <p:spPr>
+          <a:xfrm>
+            <a:off x="0" y="0"/>
+            <a:ext cx="12192000" cy="6858000"/>
+          </a:xfrm>
+          <a:prstGeom prst="rect">
+            <a:avLst/>
+          </a:prstGeom>
+          <a:solidFill>
+            <a:srgbClr val="4E4E4E"/>
+          </a:solidFill>
+          <a:ln>
+            <a:noFill/>
+          </a:ln>
+        </p:spPr>
+        <p:style>
+          <a:lnRef idx="2">
+            <a:schemeClr val="accent1">
+              <a:shade val="50000"/>
+            </a:schemeClr>
+          </a:lnRef>
+          <a:fillRef idx="1">
+            <a:schemeClr val="accent1"/>
+          </a:fillRef>
+          <a:effectRef idx="0">
+            <a:schemeClr val="accent1"/>
+          </a:effectRef>
+          <a:fontRef idx="minor">
+            <a:schemeClr val="lt1"/>
+          </a:fontRef>
+        </p:style>
+        <p:txBody>
+          <a:bodyPr rtlCol="0" anchor="ctr"/>
+          <a:lstStyle/>
+          <a:p>
+            <a:pPr algn="ctr"/>
+            <a:endParaRPr lang="en-US"/>
+          </a:p>
+        </p:txBody>
+      </p:sp>
+      <p:sp>
+        <p:nvSpPr>
+          <p:cNvPr id="16" name="Rectangle 15">
+            <a:extLst>
+              <a:ext uri="{FF2B5EF4-FFF2-40B4-BE49-F238E27FC236}">
+                <a16:creationId xmlns:a16="http://schemas.microsoft.com/office/drawing/2014/main" id="{38EE4E44-1403-472B-8C01-D354CB8F5AE7}"/>
+              </a:ext>
+              <a:ext uri="{C183D7F6-B498-43B3-948B-1728B52AA6E4}">
+                <adec:decorative xmlns:adec="http://schemas.microsoft.com/office/drawing/2017/decorative" val="1"/>
+              </a:ext>
+            </a:extLst>
+          </p:cNvPr>
+          <p:cNvSpPr>
+            <a:spLocks noGrp="1" noRot="1" noChangeAspect="1" noMove="1" noResize="1" noEditPoints="1" noAdjustHandles="1" noChangeArrowheads="1" noChangeShapeType="1" noTextEdit="1"/>
+          </p:cNvSpPr>
+          <p:nvPr>
+            <p:extLst>
+              <p:ext uri="{386F3935-93C4-4BCD-93E2-E3B085C9AB24}">
+                <p16:designElem xmlns:p16="http://schemas.microsoft.com/office/powerpoint/2015/main" val="1"/>
+              </p:ext>
+            </p:extLst>
+          </p:nvPr>
+        </p:nvSpPr>
+        <p:spPr>
+          <a:xfrm>
+            <a:off x="6256866" y="480060"/>
+            <a:ext cx="5458122" cy="5897880"/>
+          </a:xfrm>
+          <a:prstGeom prst="rect">
+            <a:avLst/>
+          </a:prstGeom>
+          <a:solidFill>
+            <a:srgbClr val="FFFFFF"/>
+          </a:solidFill>
+          <a:ln>
+            <a:noFill/>
+          </a:ln>
+        </p:spPr>
+        <p:style>
+          <a:lnRef idx="2">
+            <a:schemeClr val="accent1">
+              <a:shade val="50000"/>
+            </a:schemeClr>
+          </a:lnRef>
+          <a:fillRef idx="1">
+            <a:schemeClr val="accent1"/>
+          </a:fillRef>
+          <a:effectRef idx="0">
+            <a:schemeClr val="accent1"/>
+          </a:effectRef>
+          <a:fontRef idx="minor">
+            <a:schemeClr val="lt1"/>
+          </a:fontRef>
+        </p:style>
+        <p:txBody>
+          <a:bodyPr rtlCol="0" anchor="ctr"/>
+          <a:lstStyle/>
+          <a:p>
+            <a:pPr algn="ctr"/>
+            <a:endParaRPr lang="en-US"/>
+          </a:p>
+        </p:txBody>
+      </p:sp>
+      <p:pic>
+        <p:nvPicPr>
+          <p:cNvPr id="7" name="Picture 6" descr="A person sitting in a box with a computer and a calculator&#10;&#10;Description automatically generated">
+            <a:extLst>
+              <a:ext uri="{FF2B5EF4-FFF2-40B4-BE49-F238E27FC236}">
+                <a16:creationId xmlns:a16="http://schemas.microsoft.com/office/drawing/2014/main" id="{3377CC82-6195-69E4-FBB2-34A0FFAD7CEF}"/>
+              </a:ext>
+            </a:extLst>
+          </p:cNvPr>
+          <p:cNvPicPr>
+            <a:picLocks noChangeAspect="1"/>
+          </p:cNvPicPr>
+          <p:nvPr/>
+        </p:nvPicPr>
+        <p:blipFill>
+          <a:blip r:embed="rId3">
+            <a:extLst>
+              <a:ext uri="{28A0092B-C50C-407E-A947-70E740481C1C}">
+                <a14:useLocalDpi xmlns:a14="http://schemas.microsoft.com/office/drawing/2010/main" val="0"/>
+              </a:ext>
+            </a:extLst>
+          </a:blip>
+          <a:srcRect l="1711" r="6213" b="2"/>
+          <a:stretch/>
+        </p:blipFill>
+        <p:spPr>
+          <a:xfrm>
+            <a:off x="6421035" y="643467"/>
+            <a:ext cx="5129784" cy="5571066"/>
+          </a:xfrm>
+          <a:prstGeom prst="rect">
+            <a:avLst/>
+          </a:prstGeom>
+        </p:spPr>
+      </p:pic>
+      <p:sp>
+        <p:nvSpPr>
+          <p:cNvPr id="18" name="Rectangle 17">
+            <a:extLst>
+              <a:ext uri="{FF2B5EF4-FFF2-40B4-BE49-F238E27FC236}">
+                <a16:creationId xmlns:a16="http://schemas.microsoft.com/office/drawing/2014/main" id="{583CCE40-4C5F-42D3-86D9-7892AD1E98E3}"/>
+              </a:ext>
+              <a:ext uri="{C183D7F6-B498-43B3-948B-1728B52AA6E4}">
+                <adec:decorative xmlns:adec="http://schemas.microsoft.com/office/drawing/2017/decorative" val="1"/>
+              </a:ext>
+            </a:extLst>
+          </p:cNvPr>
+          <p:cNvSpPr>
+            <a:spLocks noGrp="1" noRot="1" noChangeAspect="1" noMove="1" noResize="1" noEditPoints="1" noAdjustHandles="1" noChangeArrowheads="1" noChangeShapeType="1" noTextEdit="1"/>
+          </p:cNvSpPr>
+          <p:nvPr>
+            <p:extLst>
+              <p:ext uri="{386F3935-93C4-4BCD-93E2-E3B085C9AB24}">
+                <p16:designElem xmlns:p16="http://schemas.microsoft.com/office/powerpoint/2015/main" val="1"/>
+              </p:ext>
+            </p:extLst>
+          </p:nvPr>
+        </p:nvSpPr>
+        <p:spPr>
+          <a:xfrm>
+            <a:off x="477012" y="480060"/>
+            <a:ext cx="5458121" cy="5897880"/>
+          </a:xfrm>
+          <a:prstGeom prst="rect">
+            <a:avLst/>
+          </a:prstGeom>
+          <a:solidFill>
+            <a:srgbClr val="FFFFFF"/>
+          </a:solidFill>
+          <a:ln>
+            <a:noFill/>
+          </a:ln>
+        </p:spPr>
+        <p:style>
+          <a:lnRef idx="2">
+            <a:schemeClr val="accent1">
+              <a:shade val="50000"/>
+            </a:schemeClr>
+          </a:lnRef>
+          <a:fillRef idx="1">
+            <a:schemeClr val="accent1"/>
+          </a:fillRef>
+          <a:effectRef idx="0">
+            <a:schemeClr val="accent1"/>
+          </a:effectRef>
+          <a:fontRef idx="minor">
+            <a:schemeClr val="lt1"/>
+          </a:fontRef>
+        </p:style>
+        <p:txBody>
+          <a:bodyPr rtlCol="0" anchor="ctr"/>
+          <a:lstStyle/>
+          <a:p>
+            <a:pPr algn="ctr"/>
+            <a:endParaRPr lang="en-US"/>
+          </a:p>
+        </p:txBody>
+      </p:sp>
+      <p:pic>
+        <p:nvPicPr>
+          <p:cNvPr id="9" name="Picture 8" descr="A person sitting in a box with a tablet&#10;&#10;Description automatically generated">
+            <a:extLst>
+              <a:ext uri="{FF2B5EF4-FFF2-40B4-BE49-F238E27FC236}">
+                <a16:creationId xmlns:a16="http://schemas.microsoft.com/office/drawing/2014/main" id="{D8305082-B9AA-DDA6-2C5D-B76CFFB3A31C}"/>
+              </a:ext>
+            </a:extLst>
+          </p:cNvPr>
+          <p:cNvPicPr>
+            <a:picLocks noChangeAspect="1"/>
+          </p:cNvPicPr>
+          <p:nvPr/>
+        </p:nvPicPr>
+        <p:blipFill>
+          <a:blip r:embed="rId4">
+            <a:extLst>
+              <a:ext uri="{28A0092B-C50C-407E-A947-70E740481C1C}">
+                <a14:useLocalDpi xmlns:a14="http://schemas.microsoft.com/office/drawing/2010/main" val="0"/>
+              </a:ext>
+            </a:extLst>
+          </a:blip>
+          <a:srcRect l="1501" r="6422" b="2"/>
+          <a:stretch/>
+        </p:blipFill>
+        <p:spPr>
+          <a:xfrm>
+            <a:off x="641180" y="643467"/>
+            <a:ext cx="5129784" cy="5571066"/>
+          </a:xfrm>
+          <a:prstGeom prst="rect">
+            <a:avLst/>
+          </a:prstGeom>
+        </p:spPr>
+      </p:pic>
+    </p:spTree>
+    <p:extLst>
+      <p:ext uri="{BB962C8B-B14F-4D97-AF65-F5344CB8AC3E}">
+        <p14:creationId xmlns:p14="http://schemas.microsoft.com/office/powerpoint/2010/main" val="855999847"/>
+      </p:ext>
+    </p:extLst>
+  </p:cSld>
+  <p:clrMapOvr>
+    <a:masterClrMapping/>
+  </p:clrMapOvr>
+</p:sld>
+</file>
+
+<file path=ppt/slides/slide13.xml><?xml version="1.0" encoding="utf-8"?>
+<p:sld xmlns:a="http://schemas.openxmlformats.org/drawingml/2006/main" xmlns:r="http://schemas.openxmlformats.org/officeDocument/2006/relationships" xmlns:p="http://schemas.openxmlformats.org/presentationml/2006/main">
+  <p:cSld>
+    <p:spTree>
+      <p:nvGrpSpPr>
+        <p:cNvPr id="1" name=""/>
+        <p:cNvGrpSpPr/>
+        <p:nvPr/>
+      </p:nvGrpSpPr>
+      <p:grpSpPr>
+        <a:xfrm>
+          <a:off x="0" y="0"/>
+          <a:ext cx="0" cy="0"/>
+          <a:chOff x="0" y="0"/>
+          <a:chExt cx="0" cy="0"/>
+        </a:xfrm>
+      </p:grpSpPr>
+      <p:sp>
+        <p:nvSpPr>
+          <p:cNvPr id="2" name="Flowchart: Manual Operation 1">
+            <a:extLst>
+              <a:ext uri="{FF2B5EF4-FFF2-40B4-BE49-F238E27FC236}">
+                <a16:creationId xmlns:a16="http://schemas.microsoft.com/office/drawing/2014/main" id="{58C3442A-6B31-E22A-33A3-7CF67365E020}"/>
+              </a:ext>
+            </a:extLst>
+          </p:cNvPr>
+          <p:cNvSpPr/>
+          <p:nvPr/>
+        </p:nvSpPr>
+        <p:spPr>
+          <a:xfrm rot="10800000">
+            <a:off x="6862916" y="3667433"/>
+            <a:ext cx="796413" cy="766916"/>
+          </a:xfrm>
+          <a:prstGeom prst="flowChartManualOperation">
+            <a:avLst/>
+          </a:prstGeom>
+        </p:spPr>
+        <p:style>
+          <a:lnRef idx="2">
+            <a:schemeClr val="accent1">
+              <a:shade val="15000"/>
+            </a:schemeClr>
+          </a:lnRef>
+          <a:fillRef idx="1">
+            <a:schemeClr val="accent1"/>
+          </a:fillRef>
+          <a:effectRef idx="0">
+            <a:schemeClr val="accent1"/>
+          </a:effectRef>
+          <a:fontRef idx="minor">
+            <a:schemeClr val="lt1"/>
+          </a:fontRef>
+        </p:style>
+        <p:txBody>
+          <a:bodyPr rtlCol="0" anchor="ctr"/>
+          <a:lstStyle/>
+          <a:p>
+            <a:pPr algn="ctr"/>
+            <a:endParaRPr lang="fr-CA"/>
+          </a:p>
+        </p:txBody>
+      </p:sp>
       <p:sp>
         <p:nvSpPr>
           <p:cNvPr id="7" name="Cube 6">
@@ -8849,7 +10320,7 @@
 </p:sld>
 </file>
 
-<file path=ppt/slides/slide12.xml><?xml version="1.0" encoding="utf-8"?>
+<file path=ppt/slides/slide14.xml><?xml version="1.0" encoding="utf-8"?>
 <p:sld xmlns:a="http://schemas.openxmlformats.org/drawingml/2006/main" xmlns:r="http://schemas.openxmlformats.org/officeDocument/2006/relationships" xmlns:p="http://schemas.openxmlformats.org/presentationml/2006/main">
   <p:cSld>
     <p:spTree>
@@ -9219,7 +10690,7 @@
 </p:sld>
 </file>
 
-<file path=ppt/slides/slide13.xml><?xml version="1.0" encoding="utf-8"?>
+<file path=ppt/slides/slide15.xml><?xml version="1.0" encoding="utf-8"?>
 <p:sld xmlns:a="http://schemas.openxmlformats.org/drawingml/2006/main" xmlns:r="http://schemas.openxmlformats.org/officeDocument/2006/relationships" xmlns:p="http://schemas.openxmlformats.org/presentationml/2006/main">
   <p:cSld>
     <p:spTree>
@@ -10195,7 +11666,7 @@
 </p:sld>
 </file>
 
-<file path=ppt/slides/slide14.xml><?xml version="1.0" encoding="utf-8"?>
+<file path=ppt/slides/slide16.xml><?xml version="1.0" encoding="utf-8"?>
 <p:sld xmlns:a="http://schemas.openxmlformats.org/drawingml/2006/main" xmlns:r="http://schemas.openxmlformats.org/officeDocument/2006/relationships" xmlns:p="http://schemas.openxmlformats.org/presentationml/2006/main">
   <p:cSld>
     <p:spTree>
@@ -10664,7 +12135,7 @@
 </p:sld>
 </file>
 
-<file path=ppt/slides/slide15.xml><?xml version="1.0" encoding="utf-8"?>
+<file path=ppt/slides/slide17.xml><?xml version="1.0" encoding="utf-8"?>
 <p:sld xmlns:a="http://schemas.openxmlformats.org/drawingml/2006/main" xmlns:r="http://schemas.openxmlformats.org/officeDocument/2006/relationships" xmlns:p="http://schemas.openxmlformats.org/presentationml/2006/main">
   <p:cSld>
     <p:spTree>
@@ -10977,7 +12448,7 @@
 </p:sld>
 </file>
 
-<file path=ppt/slides/slide16.xml><?xml version="1.0" encoding="utf-8"?>
+<file path=ppt/slides/slide18.xml><?xml version="1.0" encoding="utf-8"?>
 <p:sld xmlns:a="http://schemas.openxmlformats.org/drawingml/2006/main" xmlns:r="http://schemas.openxmlformats.org/officeDocument/2006/relationships" xmlns:p="http://schemas.openxmlformats.org/presentationml/2006/main">
   <p:cSld>
     <p:spTree>
@@ -11360,7 +12831,7 @@
 </p:sld>
 </file>
 
-<file path=ppt/slides/slide17.xml><?xml version="1.0" encoding="utf-8"?>
+<file path=ppt/slides/slide19.xml><?xml version="1.0" encoding="utf-8"?>
 <p:sld xmlns:a="http://schemas.openxmlformats.org/drawingml/2006/main" xmlns:r="http://schemas.openxmlformats.org/officeDocument/2006/relationships" xmlns:p="http://schemas.openxmlformats.org/presentationml/2006/main">
   <p:cSld>
     <p:spTree>
@@ -11843,7 +13314,67 @@
 </p:sld>
 </file>
 
-<file path=ppt/slides/slide18.xml><?xml version="1.0" encoding="utf-8"?>
+<file path=ppt/slides/slide2.xml><?xml version="1.0" encoding="utf-8"?>
+<p:sld xmlns:a="http://schemas.openxmlformats.org/drawingml/2006/main" xmlns:r="http://schemas.openxmlformats.org/officeDocument/2006/relationships" xmlns:p="http://schemas.openxmlformats.org/presentationml/2006/main">
+  <p:cSld>
+    <p:spTree>
+      <p:nvGrpSpPr>
+        <p:cNvPr id="1" name=""/>
+        <p:cNvGrpSpPr/>
+        <p:nvPr/>
+      </p:nvGrpSpPr>
+      <p:grpSpPr>
+        <a:xfrm>
+          <a:off x="0" y="0"/>
+          <a:ext cx="0" cy="0"/>
+          <a:chOff x="0" y="0"/>
+          <a:chExt cx="0" cy="0"/>
+        </a:xfrm>
+      </p:grpSpPr>
+      <p:pic>
+        <p:nvPicPr>
+          <p:cNvPr id="4" name="Picture 3">
+            <a:extLst>
+              <a:ext uri="{FF2B5EF4-FFF2-40B4-BE49-F238E27FC236}">
+                <a16:creationId xmlns:a16="http://schemas.microsoft.com/office/drawing/2014/main" id="{81D8EE11-1066-1EF9-4BE7-BA8E4A99724B}"/>
+              </a:ext>
+            </a:extLst>
+          </p:cNvPr>
+          <p:cNvPicPr>
+            <a:picLocks noChangeAspect="1"/>
+          </p:cNvPicPr>
+          <p:nvPr/>
+        </p:nvPicPr>
+        <p:blipFill>
+          <a:blip r:embed="rId2"/>
+          <a:stretch>
+            <a:fillRect/>
+          </a:stretch>
+        </p:blipFill>
+        <p:spPr>
+          <a:xfrm>
+            <a:off x="0" y="177588"/>
+            <a:ext cx="12192000" cy="6502824"/>
+          </a:xfrm>
+          <a:prstGeom prst="rect">
+            <a:avLst/>
+          </a:prstGeom>
+        </p:spPr>
+      </p:pic>
+    </p:spTree>
+    <p:extLst>
+      <p:ext uri="{BB962C8B-B14F-4D97-AF65-F5344CB8AC3E}">
+        <p14:creationId xmlns:p14="http://schemas.microsoft.com/office/powerpoint/2010/main" val="1044688951"/>
+      </p:ext>
+    </p:extLst>
+  </p:cSld>
+  <p:clrMapOvr>
+    <a:masterClrMapping/>
+  </p:clrMapOvr>
+</p:sld>
+</file>
+
+<file path=ppt/slides/slide20.xml><?xml version="1.0" encoding="utf-8"?>
 <p:sld xmlns:a="http://schemas.openxmlformats.org/drawingml/2006/main" xmlns:r="http://schemas.openxmlformats.org/officeDocument/2006/relationships" xmlns:p="http://schemas.openxmlformats.org/presentationml/2006/main">
   <p:cSld>
     <p:spTree>
@@ -12424,7 +13955,7 @@
 </p:sld>
 </file>
 
-<file path=ppt/slides/slide19.xml><?xml version="1.0" encoding="utf-8"?>
+<file path=ppt/slides/slide21.xml><?xml version="1.0" encoding="utf-8"?>
 <p:sld xmlns:a="http://schemas.openxmlformats.org/drawingml/2006/main" xmlns:r="http://schemas.openxmlformats.org/officeDocument/2006/relationships" xmlns:p="http://schemas.openxmlformats.org/presentationml/2006/main">
   <p:cSld>
     <p:spTree>
@@ -12746,8 +14277,8 @@
           </a:fontRef>
         </p:style>
       </p:cxnSp>
-      <mc:AlternateContent xmlns:mc="http://schemas.openxmlformats.org/markup-compatibility/2006">
-        <mc:Choice xmlns:a14="http://schemas.microsoft.com/office/drawing/2010/main" Requires="a14">
+      <mc:AlternateContent xmlns:mc="http://schemas.openxmlformats.org/markup-compatibility/2006" xmlns:a14="http://schemas.microsoft.com/office/drawing/2010/main">
+        <mc:Choice Requires="a14">
           <p:sp>
             <p:nvSpPr>
               <p:cNvPr id="19" name="TextBox 18">
@@ -12776,6 +14307,7 @@
               </a:bodyPr>
               <a:lstStyle/>
               <a:p>
+                <a:pPr/>
                 <a14:m>
                   <m:oMathPara xmlns:m="http://schemas.openxmlformats.org/officeDocument/2006/math">
                     <m:oMathParaPr>
@@ -13005,7 +14537,7 @@
             </p:txBody>
           </p:sp>
         </mc:Choice>
-        <mc:Fallback>
+        <mc:Fallback xmlns="">
           <p:sp>
             <p:nvSpPr>
               <p:cNvPr id="19" name="TextBox 18">
@@ -13098,8 +14630,8 @@
           </a:p>
         </p:txBody>
       </p:sp>
-      <mc:AlternateContent xmlns:mc="http://schemas.openxmlformats.org/markup-compatibility/2006">
-        <mc:Choice xmlns:a14="http://schemas.microsoft.com/office/drawing/2010/main" Requires="a14">
+      <mc:AlternateContent xmlns:mc="http://schemas.openxmlformats.org/markup-compatibility/2006" xmlns:a14="http://schemas.microsoft.com/office/drawing/2010/main">
+        <mc:Choice Requires="a14">
           <p:sp>
             <p:nvSpPr>
               <p:cNvPr id="21" name="TextBox 20">
@@ -13128,6 +14660,7 @@
               </a:bodyPr>
               <a:lstStyle/>
               <a:p>
+                <a:pPr/>
                 <a14:m>
                   <m:oMathPara xmlns:m="http://schemas.openxmlformats.org/officeDocument/2006/math">
                     <m:oMathParaPr>
@@ -13204,7 +14737,7 @@
             </p:txBody>
           </p:sp>
         </mc:Choice>
-        <mc:Fallback>
+        <mc:Fallback xmlns="">
           <p:sp>
             <p:nvSpPr>
               <p:cNvPr id="21" name="TextBox 20">
@@ -13249,8 +14782,8 @@
           </p:sp>
         </mc:Fallback>
       </mc:AlternateContent>
-      <mc:AlternateContent xmlns:mc="http://schemas.openxmlformats.org/markup-compatibility/2006">
-        <mc:Choice xmlns:a14="http://schemas.microsoft.com/office/drawing/2010/main" Requires="a14">
+      <mc:AlternateContent xmlns:mc="http://schemas.openxmlformats.org/markup-compatibility/2006" xmlns:a14="http://schemas.microsoft.com/office/drawing/2010/main">
+        <mc:Choice Requires="a14">
           <p:sp>
             <p:nvSpPr>
               <p:cNvPr id="22" name="TextBox 21">
@@ -13279,6 +14812,7 @@
               </a:bodyPr>
               <a:lstStyle/>
               <a:p>
+                <a:pPr/>
                 <a14:m>
                   <m:oMathPara xmlns:m="http://schemas.openxmlformats.org/officeDocument/2006/math">
                     <m:oMathParaPr>
@@ -13355,7 +14889,7 @@
             </p:txBody>
           </p:sp>
         </mc:Choice>
-        <mc:Fallback>
+        <mc:Fallback xmlns="">
           <p:sp>
             <p:nvSpPr>
               <p:cNvPr id="22" name="TextBox 21">
@@ -13413,67 +14947,7 @@
 </p:sld>
 </file>
 
-<file path=ppt/slides/slide2.xml><?xml version="1.0" encoding="utf-8"?>
-<p:sld xmlns:a="http://schemas.openxmlformats.org/drawingml/2006/main" xmlns:r="http://schemas.openxmlformats.org/officeDocument/2006/relationships" xmlns:p="http://schemas.openxmlformats.org/presentationml/2006/main">
-  <p:cSld>
-    <p:spTree>
-      <p:nvGrpSpPr>
-        <p:cNvPr id="1" name=""/>
-        <p:cNvGrpSpPr/>
-        <p:nvPr/>
-      </p:nvGrpSpPr>
-      <p:grpSpPr>
-        <a:xfrm>
-          <a:off x="0" y="0"/>
-          <a:ext cx="0" cy="0"/>
-          <a:chOff x="0" y="0"/>
-          <a:chExt cx="0" cy="0"/>
-        </a:xfrm>
-      </p:grpSpPr>
-      <p:pic>
-        <p:nvPicPr>
-          <p:cNvPr id="4" name="Picture 3">
-            <a:extLst>
-              <a:ext uri="{FF2B5EF4-FFF2-40B4-BE49-F238E27FC236}">
-                <a16:creationId xmlns:a16="http://schemas.microsoft.com/office/drawing/2014/main" id="{81D8EE11-1066-1EF9-4BE7-BA8E4A99724B}"/>
-              </a:ext>
-            </a:extLst>
-          </p:cNvPr>
-          <p:cNvPicPr>
-            <a:picLocks noChangeAspect="1"/>
-          </p:cNvPicPr>
-          <p:nvPr/>
-        </p:nvPicPr>
-        <p:blipFill>
-          <a:blip r:embed="rId2"/>
-          <a:stretch>
-            <a:fillRect/>
-          </a:stretch>
-        </p:blipFill>
-        <p:spPr>
-          <a:xfrm>
-            <a:off x="0" y="177588"/>
-            <a:ext cx="12192000" cy="6502824"/>
-          </a:xfrm>
-          <a:prstGeom prst="rect">
-            <a:avLst/>
-          </a:prstGeom>
-        </p:spPr>
-      </p:pic>
-    </p:spTree>
-    <p:extLst>
-      <p:ext uri="{BB962C8B-B14F-4D97-AF65-F5344CB8AC3E}">
-        <p14:creationId xmlns:p14="http://schemas.microsoft.com/office/powerpoint/2010/main" val="1044688951"/>
-      </p:ext>
-    </p:extLst>
-  </p:cSld>
-  <p:clrMapOvr>
-    <a:masterClrMapping/>
-  </p:clrMapOvr>
-</p:sld>
-</file>
-
-<file path=ppt/slides/slide20.xml><?xml version="1.0" encoding="utf-8"?>
+<file path=ppt/slides/slide22.xml><?xml version="1.0" encoding="utf-8"?>
 <p:sld xmlns:a="http://schemas.openxmlformats.org/drawingml/2006/main" xmlns:r="http://schemas.openxmlformats.org/officeDocument/2006/relationships" xmlns:p="http://schemas.openxmlformats.org/presentationml/2006/main">
   <p:cSld>
     <p:spTree>
@@ -13843,8 +15317,8 @@
           </a:p>
         </p:txBody>
       </p:sp>
-      <mc:AlternateContent xmlns:mc="http://schemas.openxmlformats.org/markup-compatibility/2006">
-        <mc:Choice xmlns:a14="http://schemas.microsoft.com/office/drawing/2010/main" Requires="a14">
+      <mc:AlternateContent xmlns:mc="http://schemas.openxmlformats.org/markup-compatibility/2006" xmlns:a14="http://schemas.microsoft.com/office/drawing/2010/main">
+        <mc:Choice Requires="a14">
           <p:sp>
             <p:nvSpPr>
               <p:cNvPr id="12" name="TextBox 11">
@@ -13873,6 +15347,7 @@
               </a:bodyPr>
               <a:lstStyle/>
               <a:p>
+                <a:pPr/>
                 <a14:m>
                   <m:oMathPara xmlns:m="http://schemas.openxmlformats.org/officeDocument/2006/math">
                     <m:oMathParaPr>
@@ -13949,7 +15424,7 @@
             </p:txBody>
           </p:sp>
         </mc:Choice>
-        <mc:Fallback>
+        <mc:Fallback xmlns="">
           <p:sp>
             <p:nvSpPr>
               <p:cNvPr id="12" name="TextBox 11">
@@ -13994,8 +15469,8 @@
           </p:sp>
         </mc:Fallback>
       </mc:AlternateContent>
-      <mc:AlternateContent xmlns:mc="http://schemas.openxmlformats.org/markup-compatibility/2006">
-        <mc:Choice xmlns:a14="http://schemas.microsoft.com/office/drawing/2010/main" Requires="a14">
+      <mc:AlternateContent xmlns:mc="http://schemas.openxmlformats.org/markup-compatibility/2006" xmlns:a14="http://schemas.microsoft.com/office/drawing/2010/main">
+        <mc:Choice Requires="a14">
           <p:sp>
             <p:nvSpPr>
               <p:cNvPr id="13" name="TextBox 12">
@@ -14024,6 +15499,7 @@
               </a:bodyPr>
               <a:lstStyle/>
               <a:p>
+                <a:pPr/>
                 <a14:m>
                   <m:oMathPara xmlns:m="http://schemas.openxmlformats.org/officeDocument/2006/math">
                     <m:oMathParaPr>
@@ -14100,7 +15576,7 @@
             </p:txBody>
           </p:sp>
         </mc:Choice>
-        <mc:Fallback>
+        <mc:Fallback xmlns="">
           <p:sp>
             <p:nvSpPr>
               <p:cNvPr id="13" name="TextBox 12">
@@ -14145,8 +15621,8 @@
           </p:sp>
         </mc:Fallback>
       </mc:AlternateContent>
-      <mc:AlternateContent xmlns:mc="http://schemas.openxmlformats.org/markup-compatibility/2006">
-        <mc:Choice xmlns:a14="http://schemas.microsoft.com/office/drawing/2010/main" Requires="a14">
+      <mc:AlternateContent xmlns:mc="http://schemas.openxmlformats.org/markup-compatibility/2006" xmlns:a14="http://schemas.microsoft.com/office/drawing/2010/main">
+        <mc:Choice Requires="a14">
           <p:sp>
             <p:nvSpPr>
               <p:cNvPr id="14" name="TextBox 13">
@@ -14175,6 +15651,7 @@
               </a:bodyPr>
               <a:lstStyle/>
               <a:p>
+                <a:pPr/>
                 <a14:m>
                   <m:oMathPara xmlns:m="http://schemas.openxmlformats.org/officeDocument/2006/math">
                     <m:oMathParaPr>
@@ -14196,7 +15673,7 @@
             </p:txBody>
           </p:sp>
         </mc:Choice>
-        <mc:Fallback>
+        <mc:Fallback xmlns="">
           <p:sp>
             <p:nvSpPr>
               <p:cNvPr id="14" name="TextBox 13">
@@ -14289,8 +15766,8 @@
           </a:p>
         </p:txBody>
       </p:sp>
-      <mc:AlternateContent xmlns:mc="http://schemas.openxmlformats.org/markup-compatibility/2006">
-        <mc:Choice xmlns:a14="http://schemas.microsoft.com/office/drawing/2010/main" Requires="a14">
+      <mc:AlternateContent xmlns:mc="http://schemas.openxmlformats.org/markup-compatibility/2006" xmlns:a14="http://schemas.microsoft.com/office/drawing/2010/main">
+        <mc:Choice Requires="a14">
           <p:sp>
             <p:nvSpPr>
               <p:cNvPr id="16" name="TextBox 15">
@@ -14319,6 +15796,7 @@
               </a:bodyPr>
               <a:lstStyle/>
               <a:p>
+                <a:pPr/>
                 <a14:m>
                   <m:oMathPara xmlns:m="http://schemas.openxmlformats.org/officeDocument/2006/math">
                     <m:oMathParaPr>
@@ -14549,7 +16027,7 @@
             </p:txBody>
           </p:sp>
         </mc:Choice>
-        <mc:Fallback>
+        <mc:Fallback xmlns="">
           <p:sp>
             <p:nvSpPr>
               <p:cNvPr id="16" name="TextBox 15">
@@ -20078,4 +21556,319 @@
     </a:ext>
   </a:extLst>
 </a:theme>
+</file>
+
+<file path=ppt/theme/theme2.xml><?xml version="1.0" encoding="utf-8"?>
+<a:theme xmlns:a="http://schemas.openxmlformats.org/drawingml/2006/main" name="Office Theme">
+  <a:themeElements>
+    <a:clrScheme name="Office">
+      <a:dk1>
+        <a:sysClr val="windowText" lastClr="000000"/>
+      </a:dk1>
+      <a:lt1>
+        <a:sysClr val="window" lastClr="FFFFFF"/>
+      </a:lt1>
+      <a:dk2>
+        <a:srgbClr val="0E2841"/>
+      </a:dk2>
+      <a:lt2>
+        <a:srgbClr val="E8E8E8"/>
+      </a:lt2>
+      <a:accent1>
+        <a:srgbClr val="156082"/>
+      </a:accent1>
+      <a:accent2>
+        <a:srgbClr val="E97132"/>
+      </a:accent2>
+      <a:accent3>
+        <a:srgbClr val="196B24"/>
+      </a:accent3>
+      <a:accent4>
+        <a:srgbClr val="0F9ED5"/>
+      </a:accent4>
+      <a:accent5>
+        <a:srgbClr val="A02B93"/>
+      </a:accent5>
+      <a:accent6>
+        <a:srgbClr val="4EA72E"/>
+      </a:accent6>
+      <a:hlink>
+        <a:srgbClr val="467886"/>
+      </a:hlink>
+      <a:folHlink>
+        <a:srgbClr val="96607D"/>
+      </a:folHlink>
+    </a:clrScheme>
+    <a:fontScheme name="Office">
+      <a:majorFont>
+        <a:latin typeface="Aptos Display" panose="02110004020202020204"/>
+        <a:ea typeface=""/>
+        <a:cs typeface=""/>
+        <a:font script="Jpan" typeface="游ゴシック Light"/>
+        <a:font script="Hang" typeface="맑은 고딕"/>
+        <a:font script="Hans" typeface="等线 Light"/>
+        <a:font script="Hant" typeface="新細明體"/>
+        <a:font script="Arab" typeface="Times New Roman"/>
+        <a:font script="Hebr" typeface="Times New Roman"/>
+        <a:font script="Thai" typeface="Angsana New"/>
+        <a:font script="Ethi" typeface="Nyala"/>
+        <a:font script="Beng" typeface="Vrinda"/>
+        <a:font script="Gujr" typeface="Shruti"/>
+        <a:font script="Khmr" typeface="MoolBoran"/>
+        <a:font script="Knda" typeface="Tunga"/>
+        <a:font script="Guru" typeface="Raavi"/>
+        <a:font script="Cans" typeface="Euphemia"/>
+        <a:font script="Cher" typeface="Plantagenet Cherokee"/>
+        <a:font script="Yiii" typeface="Microsoft Yi Baiti"/>
+        <a:font script="Tibt" typeface="Microsoft Himalaya"/>
+        <a:font script="Thaa" typeface="MV Boli"/>
+        <a:font script="Deva" typeface="Mangal"/>
+        <a:font script="Telu" typeface="Gautami"/>
+        <a:font script="Taml" typeface="Latha"/>
+        <a:font script="Syrc" typeface="Estrangelo Edessa"/>
+        <a:font script="Orya" typeface="Kalinga"/>
+        <a:font script="Mlym" typeface="Kartika"/>
+        <a:font script="Laoo" typeface="DokChampa"/>
+        <a:font script="Sinh" typeface="Iskoola Pota"/>
+        <a:font script="Mong" typeface="Mongolian Baiti"/>
+        <a:font script="Viet" typeface="Times New Roman"/>
+        <a:font script="Uigh" typeface="Microsoft Uighur"/>
+        <a:font script="Geor" typeface="Sylfaen"/>
+        <a:font script="Armn" typeface="Arial"/>
+        <a:font script="Bugi" typeface="Leelawadee UI"/>
+        <a:font script="Bopo" typeface="Microsoft JhengHei"/>
+        <a:font script="Java" typeface="Javanese Text"/>
+        <a:font script="Lisu" typeface="Segoe UI"/>
+        <a:font script="Mymr" typeface="Myanmar Text"/>
+        <a:font script="Nkoo" typeface="Ebrima"/>
+        <a:font script="Olck" typeface="Nirmala UI"/>
+        <a:font script="Osma" typeface="Ebrima"/>
+        <a:font script="Phag" typeface="Phagspa"/>
+        <a:font script="Syrn" typeface="Estrangelo Edessa"/>
+        <a:font script="Syrj" typeface="Estrangelo Edessa"/>
+        <a:font script="Syre" typeface="Estrangelo Edessa"/>
+        <a:font script="Sora" typeface="Nirmala UI"/>
+        <a:font script="Tale" typeface="Microsoft Tai Le"/>
+        <a:font script="Talu" typeface="Microsoft New Tai Lue"/>
+        <a:font script="Tfng" typeface="Ebrima"/>
+      </a:majorFont>
+      <a:minorFont>
+        <a:latin typeface="Aptos" panose="02110004020202020204"/>
+        <a:ea typeface=""/>
+        <a:cs typeface=""/>
+        <a:font script="Jpan" typeface="游ゴシック"/>
+        <a:font script="Hang" typeface="맑은 고딕"/>
+        <a:font script="Hans" typeface="等线"/>
+        <a:font script="Hant" typeface="新細明體"/>
+        <a:font script="Arab" typeface="Arial"/>
+        <a:font script="Hebr" typeface="Arial"/>
+        <a:font script="Thai" typeface="Cordia New"/>
+        <a:font script="Ethi" typeface="Nyala"/>
+        <a:font script="Beng" typeface="Vrinda"/>
+        <a:font script="Gujr" typeface="Shruti"/>
+        <a:font script="Khmr" typeface="DaunPenh"/>
+        <a:font script="Knda" typeface="Tunga"/>
+        <a:font script="Guru" typeface="Raavi"/>
+        <a:font script="Cans" typeface="Euphemia"/>
+        <a:font script="Cher" typeface="Plantagenet Cherokee"/>
+        <a:font script="Yiii" typeface="Microsoft Yi Baiti"/>
+        <a:font script="Tibt" typeface="Microsoft Himalaya"/>
+        <a:font script="Thaa" typeface="MV Boli"/>
+        <a:font script="Deva" typeface="Mangal"/>
+        <a:font script="Telu" typeface="Gautami"/>
+        <a:font script="Taml" typeface="Latha"/>
+        <a:font script="Syrc" typeface="Estrangelo Edessa"/>
+        <a:font script="Orya" typeface="Kalinga"/>
+        <a:font script="Mlym" typeface="Kartika"/>
+        <a:font script="Laoo" typeface="DokChampa"/>
+        <a:font script="Sinh" typeface="Iskoola Pota"/>
+        <a:font script="Mong" typeface="Mongolian Baiti"/>
+        <a:font script="Viet" typeface="Arial"/>
+        <a:font script="Uigh" typeface="Microsoft Uighur"/>
+        <a:font script="Geor" typeface="Sylfaen"/>
+        <a:font script="Armn" typeface="Arial"/>
+        <a:font script="Bugi" typeface="Leelawadee UI"/>
+        <a:font script="Bopo" typeface="Microsoft JhengHei"/>
+        <a:font script="Java" typeface="Javanese Text"/>
+        <a:font script="Lisu" typeface="Segoe UI"/>
+        <a:font script="Mymr" typeface="Myanmar Text"/>
+        <a:font script="Nkoo" typeface="Ebrima"/>
+        <a:font script="Olck" typeface="Nirmala UI"/>
+        <a:font script="Osma" typeface="Ebrima"/>
+        <a:font script="Phag" typeface="Phagspa"/>
+        <a:font script="Syrn" typeface="Estrangelo Edessa"/>
+        <a:font script="Syrj" typeface="Estrangelo Edessa"/>
+        <a:font script="Syre" typeface="Estrangelo Edessa"/>
+        <a:font script="Sora" typeface="Nirmala UI"/>
+        <a:font script="Tale" typeface="Microsoft Tai Le"/>
+        <a:font script="Talu" typeface="Microsoft New Tai Lue"/>
+        <a:font script="Tfng" typeface="Ebrima"/>
+      </a:minorFont>
+    </a:fontScheme>
+    <a:fmtScheme name="Office">
+      <a:fillStyleLst>
+        <a:solidFill>
+          <a:schemeClr val="phClr"/>
+        </a:solidFill>
+        <a:gradFill rotWithShape="1">
+          <a:gsLst>
+            <a:gs pos="0">
+              <a:schemeClr val="phClr">
+                <a:lumMod val="110000"/>
+                <a:satMod val="105000"/>
+                <a:tint val="67000"/>
+              </a:schemeClr>
+            </a:gs>
+            <a:gs pos="50000">
+              <a:schemeClr val="phClr">
+                <a:lumMod val="105000"/>
+                <a:satMod val="103000"/>
+                <a:tint val="73000"/>
+              </a:schemeClr>
+            </a:gs>
+            <a:gs pos="100000">
+              <a:schemeClr val="phClr">
+                <a:lumMod val="105000"/>
+                <a:satMod val="109000"/>
+                <a:tint val="81000"/>
+              </a:schemeClr>
+            </a:gs>
+          </a:gsLst>
+          <a:lin ang="5400000" scaled="0"/>
+        </a:gradFill>
+        <a:gradFill rotWithShape="1">
+          <a:gsLst>
+            <a:gs pos="0">
+              <a:schemeClr val="phClr">
+                <a:satMod val="103000"/>
+                <a:lumMod val="102000"/>
+                <a:tint val="94000"/>
+              </a:schemeClr>
+            </a:gs>
+            <a:gs pos="50000">
+              <a:schemeClr val="phClr">
+                <a:satMod val="110000"/>
+                <a:lumMod val="100000"/>
+                <a:shade val="100000"/>
+              </a:schemeClr>
+            </a:gs>
+            <a:gs pos="100000">
+              <a:schemeClr val="phClr">
+                <a:lumMod val="99000"/>
+                <a:satMod val="120000"/>
+                <a:shade val="78000"/>
+              </a:schemeClr>
+            </a:gs>
+          </a:gsLst>
+          <a:lin ang="5400000" scaled="0"/>
+        </a:gradFill>
+      </a:fillStyleLst>
+      <a:lnStyleLst>
+        <a:ln w="12700" cap="flat" cmpd="sng" algn="ctr">
+          <a:solidFill>
+            <a:schemeClr val="phClr"/>
+          </a:solidFill>
+          <a:prstDash val="solid"/>
+          <a:miter lim="800000"/>
+        </a:ln>
+        <a:ln w="19050" cap="flat" cmpd="sng" algn="ctr">
+          <a:solidFill>
+            <a:schemeClr val="phClr"/>
+          </a:solidFill>
+          <a:prstDash val="solid"/>
+          <a:miter lim="800000"/>
+        </a:ln>
+        <a:ln w="25400" cap="flat" cmpd="sng" algn="ctr">
+          <a:solidFill>
+            <a:schemeClr val="phClr"/>
+          </a:solidFill>
+          <a:prstDash val="solid"/>
+          <a:miter lim="800000"/>
+        </a:ln>
+      </a:lnStyleLst>
+      <a:effectStyleLst>
+        <a:effectStyle>
+          <a:effectLst/>
+        </a:effectStyle>
+        <a:effectStyle>
+          <a:effectLst/>
+        </a:effectStyle>
+        <a:effectStyle>
+          <a:effectLst>
+            <a:outerShdw blurRad="57150" dist="19050" dir="5400000" algn="ctr" rotWithShape="0">
+              <a:srgbClr val="000000">
+                <a:alpha val="63000"/>
+              </a:srgbClr>
+            </a:outerShdw>
+          </a:effectLst>
+        </a:effectStyle>
+      </a:effectStyleLst>
+      <a:bgFillStyleLst>
+        <a:solidFill>
+          <a:schemeClr val="phClr"/>
+        </a:solidFill>
+        <a:solidFill>
+          <a:schemeClr val="phClr">
+            <a:tint val="95000"/>
+            <a:satMod val="170000"/>
+          </a:schemeClr>
+        </a:solidFill>
+        <a:gradFill rotWithShape="1">
+          <a:gsLst>
+            <a:gs pos="0">
+              <a:schemeClr val="phClr">
+                <a:tint val="93000"/>
+                <a:satMod val="150000"/>
+                <a:shade val="98000"/>
+                <a:lumMod val="102000"/>
+              </a:schemeClr>
+            </a:gs>
+            <a:gs pos="50000">
+              <a:schemeClr val="phClr">
+                <a:tint val="98000"/>
+                <a:satMod val="130000"/>
+                <a:shade val="90000"/>
+                <a:lumMod val="103000"/>
+              </a:schemeClr>
+            </a:gs>
+            <a:gs pos="100000">
+              <a:schemeClr val="phClr">
+                <a:shade val="63000"/>
+                <a:satMod val="120000"/>
+              </a:schemeClr>
+            </a:gs>
+          </a:gsLst>
+          <a:lin ang="5400000" scaled="0"/>
+        </a:gradFill>
+      </a:bgFillStyleLst>
+    </a:fmtScheme>
+  </a:themeElements>
+  <a:objectDefaults>
+    <a:lnDef>
+      <a:spPr/>
+      <a:bodyPr/>
+      <a:lstStyle/>
+      <a:style>
+        <a:lnRef idx="2">
+          <a:schemeClr val="accent1"/>
+        </a:lnRef>
+        <a:fillRef idx="0">
+          <a:schemeClr val="accent1"/>
+        </a:fillRef>
+        <a:effectRef idx="1">
+          <a:schemeClr val="accent1"/>
+        </a:effectRef>
+        <a:fontRef idx="minor">
+          <a:schemeClr val="tx1"/>
+        </a:fontRef>
+      </a:style>
+    </a:lnDef>
+  </a:objectDefaults>
+  <a:extraClrSchemeLst/>
+  <a:extLst>
+    <a:ext uri="{05A4C25C-085E-4340-85A3-A5531E510DB2}">
+      <thm15:themeFamily xmlns:thm15="http://schemas.microsoft.com/office/thememl/2012/main" name="Office Theme" id="{2E142A2C-CD16-42D6-873A-C26D2A0506FA}" vid="{1BDDFF52-6CD6-40A5-AB3C-68EB2F1E4D0A}"/>
+    </a:ext>
+  </a:extLst>
+</a:theme>
 </file>
</xml_diff>